<commit_message>
added materials.xlsx, front wheel assembly stl-files & new process pictures. updated gadget schematic & sequential gadget code (tested as functional with all the actuators & sensors)
</commit_message>
<xml_diff>
--- a/pico/dev/schematic.pptx
+++ b/pico/dev/schematic.pptx
@@ -6,6 +6,9 @@
   </p:sldMasterIdLst>
   <p:sldIdLst>
     <p:sldId id="257" r:id="rId2"/>
+    <p:sldId id="258" r:id="rId3"/>
+    <p:sldId id="259" r:id="rId4"/>
+    <p:sldId id="260" r:id="rId5"/>
   </p:sldIdLst>
   <p:sldSz cx="12192000" cy="6858000"/>
   <p:notesSz cx="6858000" cy="9144000"/>
@@ -259,7 +262,7 @@
           <a:p>
             <a:fld id="{ED0355D1-E75F-4E22-96B7-73DAB928A2C2}" type="datetimeFigureOut">
               <a:rPr lang="en-GB" smtClean="0"/>
-              <a:t>15/04/2025</a:t>
+              <a:t>18/04/2025</a:t>
             </a:fld>
             <a:endParaRPr lang="en-GB"/>
           </a:p>
@@ -457,7 +460,7 @@
           <a:p>
             <a:fld id="{ED0355D1-E75F-4E22-96B7-73DAB928A2C2}" type="datetimeFigureOut">
               <a:rPr lang="en-GB" smtClean="0"/>
-              <a:t>15/04/2025</a:t>
+              <a:t>18/04/2025</a:t>
             </a:fld>
             <a:endParaRPr lang="en-GB"/>
           </a:p>
@@ -665,7 +668,7 @@
           <a:p>
             <a:fld id="{ED0355D1-E75F-4E22-96B7-73DAB928A2C2}" type="datetimeFigureOut">
               <a:rPr lang="en-GB" smtClean="0"/>
-              <a:t>15/04/2025</a:t>
+              <a:t>18/04/2025</a:t>
             </a:fld>
             <a:endParaRPr lang="en-GB"/>
           </a:p>
@@ -863,7 +866,7 @@
           <a:p>
             <a:fld id="{ED0355D1-E75F-4E22-96B7-73DAB928A2C2}" type="datetimeFigureOut">
               <a:rPr lang="en-GB" smtClean="0"/>
-              <a:t>15/04/2025</a:t>
+              <a:t>18/04/2025</a:t>
             </a:fld>
             <a:endParaRPr lang="en-GB"/>
           </a:p>
@@ -1138,7 +1141,7 @@
           <a:p>
             <a:fld id="{ED0355D1-E75F-4E22-96B7-73DAB928A2C2}" type="datetimeFigureOut">
               <a:rPr lang="en-GB" smtClean="0"/>
-              <a:t>15/04/2025</a:t>
+              <a:t>18/04/2025</a:t>
             </a:fld>
             <a:endParaRPr lang="en-GB"/>
           </a:p>
@@ -1403,7 +1406,7 @@
           <a:p>
             <a:fld id="{ED0355D1-E75F-4E22-96B7-73DAB928A2C2}" type="datetimeFigureOut">
               <a:rPr lang="en-GB" smtClean="0"/>
-              <a:t>15/04/2025</a:t>
+              <a:t>18/04/2025</a:t>
             </a:fld>
             <a:endParaRPr lang="en-GB"/>
           </a:p>
@@ -1815,7 +1818,7 @@
           <a:p>
             <a:fld id="{ED0355D1-E75F-4E22-96B7-73DAB928A2C2}" type="datetimeFigureOut">
               <a:rPr lang="en-GB" smtClean="0"/>
-              <a:t>15/04/2025</a:t>
+              <a:t>18/04/2025</a:t>
             </a:fld>
             <a:endParaRPr lang="en-GB"/>
           </a:p>
@@ -1956,7 +1959,7 @@
           <a:p>
             <a:fld id="{ED0355D1-E75F-4E22-96B7-73DAB928A2C2}" type="datetimeFigureOut">
               <a:rPr lang="en-GB" smtClean="0"/>
-              <a:t>15/04/2025</a:t>
+              <a:t>18/04/2025</a:t>
             </a:fld>
             <a:endParaRPr lang="en-GB"/>
           </a:p>
@@ -2069,7 +2072,7 @@
           <a:p>
             <a:fld id="{ED0355D1-E75F-4E22-96B7-73DAB928A2C2}" type="datetimeFigureOut">
               <a:rPr lang="en-GB" smtClean="0"/>
-              <a:t>15/04/2025</a:t>
+              <a:t>18/04/2025</a:t>
             </a:fld>
             <a:endParaRPr lang="en-GB"/>
           </a:p>
@@ -2380,7 +2383,7 @@
           <a:p>
             <a:fld id="{ED0355D1-E75F-4E22-96B7-73DAB928A2C2}" type="datetimeFigureOut">
               <a:rPr lang="en-GB" smtClean="0"/>
-              <a:t>15/04/2025</a:t>
+              <a:t>18/04/2025</a:t>
             </a:fld>
             <a:endParaRPr lang="en-GB"/>
           </a:p>
@@ -2668,7 +2671,7 @@
           <a:p>
             <a:fld id="{ED0355D1-E75F-4E22-96B7-73DAB928A2C2}" type="datetimeFigureOut">
               <a:rPr lang="en-GB" smtClean="0"/>
-              <a:t>15/04/2025</a:t>
+              <a:t>18/04/2025</a:t>
             </a:fld>
             <a:endParaRPr lang="en-GB"/>
           </a:p>
@@ -2909,7 +2912,7 @@
           <a:p>
             <a:fld id="{ED0355D1-E75F-4E22-96B7-73DAB928A2C2}" type="datetimeFigureOut">
               <a:rPr lang="en-GB" smtClean="0"/>
-              <a:t>15/04/2025</a:t>
+              <a:t>18/04/2025</a:t>
             </a:fld>
             <a:endParaRPr lang="en-GB"/>
           </a:p>
@@ -3465,8 +3468,8 @@
         </p:nvCxnSpPr>
         <p:spPr>
           <a:xfrm flipV="1">
-            <a:off x="9885078" y="817984"/>
-            <a:ext cx="966676" cy="374152"/>
+            <a:off x="9969070" y="817984"/>
+            <a:ext cx="882684" cy="577825"/>
           </a:xfrm>
           <a:prstGeom prst="line">
             <a:avLst/>
@@ -3662,14 +3665,13 @@
           </p:cNvPr>
           <p:cNvCxnSpPr>
             <a:cxnSpLocks/>
-            <a:endCxn id="24" idx="1"/>
           </p:cNvCxnSpPr>
           <p:nvPr/>
         </p:nvCxnSpPr>
         <p:spPr>
-          <a:xfrm>
-            <a:off x="7277477" y="2570619"/>
-            <a:ext cx="1124271" cy="166801"/>
+          <a:xfrm flipH="1" flipV="1">
+            <a:off x="4659441" y="2158307"/>
+            <a:ext cx="255081" cy="405799"/>
           </a:xfrm>
           <a:prstGeom prst="line">
             <a:avLst/>
@@ -3708,7 +3710,7 @@
         </p:nvSpPr>
         <p:spPr>
           <a:xfrm>
-            <a:off x="8401748" y="2583531"/>
+            <a:off x="3541965" y="1865918"/>
             <a:ext cx="1492050" cy="307777"/>
           </a:xfrm>
           <a:prstGeom prst="rect">
@@ -3747,7 +3749,7 @@
         <p:spPr>
           <a:xfrm>
             <a:off x="7259554" y="2840584"/>
-            <a:ext cx="2294265" cy="299290"/>
+            <a:ext cx="2133913" cy="299290"/>
           </a:xfrm>
           <a:prstGeom prst="line">
             <a:avLst/>
@@ -3838,7 +3840,7 @@
         <p:spPr>
           <a:xfrm>
             <a:off x="7259554" y="2840584"/>
-            <a:ext cx="1885554" cy="761373"/>
+            <a:ext cx="1719456" cy="761373"/>
           </a:xfrm>
           <a:prstGeom prst="line">
             <a:avLst/>
@@ -3878,8 +3880,8 @@
         </p:nvSpPr>
         <p:spPr>
           <a:xfrm>
-            <a:off x="9553819" y="2966917"/>
-            <a:ext cx="1479941" cy="345914"/>
+            <a:off x="9393467" y="2966917"/>
+            <a:ext cx="1640293" cy="345914"/>
           </a:xfrm>
           <a:prstGeom prst="roundRect">
             <a:avLst/>
@@ -3906,7 +3908,7 @@
             <a:pPr algn="ctr"/>
             <a:r>
               <a:rPr lang="en-GB" sz="1400" dirty="0"/>
-              <a:t>Phototransistor</a:t>
+              <a:t>Phototransistor L</a:t>
             </a:r>
           </a:p>
         </p:txBody>
@@ -3925,8 +3927,8 @@
         </p:nvSpPr>
         <p:spPr>
           <a:xfrm>
-            <a:off x="9145108" y="3429000"/>
-            <a:ext cx="1479941" cy="345914"/>
+            <a:off x="8979010" y="3429000"/>
+            <a:ext cx="1646040" cy="345914"/>
           </a:xfrm>
           <a:prstGeom prst="roundRect">
             <a:avLst/>
@@ -3953,7 +3955,7 @@
             <a:pPr algn="ctr"/>
             <a:r>
               <a:rPr lang="en-GB" sz="1400" dirty="0"/>
-              <a:t>Phototransistor</a:t>
+              <a:t>Phototransistor R</a:t>
             </a:r>
           </a:p>
         </p:txBody>
@@ -4116,7 +4118,7 @@
         </p:nvSpPr>
         <p:spPr>
           <a:xfrm>
-            <a:off x="9287530" y="2891308"/>
+            <a:off x="9106716" y="2855468"/>
             <a:ext cx="334979" cy="276999"/>
           </a:xfrm>
           <a:prstGeom prst="rect">
@@ -4152,7 +4154,7 @@
         </p:nvSpPr>
         <p:spPr>
           <a:xfrm>
-            <a:off x="8894819" y="3293874"/>
+            <a:off x="8720518" y="3290794"/>
             <a:ext cx="334979" cy="276999"/>
           </a:xfrm>
           <a:prstGeom prst="rect">
@@ -4541,8 +4543,8 @@
         </p:nvCxnSpPr>
         <p:spPr>
           <a:xfrm>
-            <a:off x="10625049" y="3601957"/>
-            <a:ext cx="82799" cy="379918"/>
+            <a:off x="10625050" y="3601957"/>
+            <a:ext cx="82798" cy="379918"/>
           </a:xfrm>
           <a:prstGeom prst="line">
             <a:avLst/>
@@ -4671,8 +4673,8 @@
         </p:nvCxnSpPr>
         <p:spPr>
           <a:xfrm>
-            <a:off x="10625049" y="3601957"/>
-            <a:ext cx="522119" cy="801805"/>
+            <a:off x="10625050" y="3601957"/>
+            <a:ext cx="522118" cy="801805"/>
           </a:xfrm>
           <a:prstGeom prst="line">
             <a:avLst/>
@@ -4950,53 +4952,6 @@
           </a:p>
         </p:txBody>
       </p:sp>
-      <p:sp>
-        <p:nvSpPr>
-          <p:cNvPr id="106" name="Rectangle: Rounded Corners 105">
-            <a:extLst>
-              <a:ext uri="{FF2B5EF4-FFF2-40B4-BE49-F238E27FC236}">
-                <a16:creationId xmlns:a16="http://schemas.microsoft.com/office/drawing/2014/main" id="{8F0EA6D2-09EC-AC96-612C-B90D33EC8D32}"/>
-              </a:ext>
-            </a:extLst>
-          </p:cNvPr>
-          <p:cNvSpPr/>
-          <p:nvPr/>
-        </p:nvSpPr>
-        <p:spPr>
-          <a:xfrm rot="19735144">
-            <a:off x="9220788" y="1034734"/>
-            <a:ext cx="739874" cy="319642"/>
-          </a:xfrm>
-          <a:prstGeom prst="roundRect">
-            <a:avLst/>
-          </a:prstGeom>
-        </p:spPr>
-        <p:style>
-          <a:lnRef idx="2">
-            <a:schemeClr val="dk1"/>
-          </a:lnRef>
-          <a:fillRef idx="1">
-            <a:schemeClr val="lt1"/>
-          </a:fillRef>
-          <a:effectRef idx="0">
-            <a:schemeClr val="dk1"/>
-          </a:effectRef>
-          <a:fontRef idx="minor">
-            <a:schemeClr val="dk1"/>
-          </a:fontRef>
-        </p:style>
-        <p:txBody>
-          <a:bodyPr rtlCol="0" anchor="ctr"/>
-          <a:lstStyle/>
-          <a:p>
-            <a:pPr algn="ctr"/>
-            <a:r>
-              <a:rPr lang="en-GB" sz="1400" dirty="0"/>
-              <a:t>Switch</a:t>
-            </a:r>
-          </a:p>
-        </p:txBody>
-      </p:sp>
       <p:cxnSp>
         <p:nvCxnSpPr>
           <p:cNvPr id="108" name="Straight Connector 107">
@@ -5013,8 +4968,8 @@
         </p:nvCxnSpPr>
         <p:spPr>
           <a:xfrm flipV="1">
-            <a:off x="8781861" y="1498100"/>
-            <a:ext cx="869885" cy="554496"/>
+            <a:off x="8781861" y="1486962"/>
+            <a:ext cx="611606" cy="565634"/>
           </a:xfrm>
           <a:prstGeom prst="line">
             <a:avLst/>
@@ -5042,10 +4997,10 @@
       </p:cxnSp>
       <p:cxnSp>
         <p:nvCxnSpPr>
-          <p:cNvPr id="110" name="Straight Connector 109">
-            <a:extLst>
-              <a:ext uri="{FF2B5EF4-FFF2-40B4-BE49-F238E27FC236}">
-                <a16:creationId xmlns:a16="http://schemas.microsoft.com/office/drawing/2014/main" id="{30A184F5-4F63-E9E8-83DE-522279A9EAC6}"/>
+          <p:cNvPr id="118" name="Straight Connector 117">
+            <a:extLst>
+              <a:ext uri="{FF2B5EF4-FFF2-40B4-BE49-F238E27FC236}">
+                <a16:creationId xmlns:a16="http://schemas.microsoft.com/office/drawing/2014/main" id="{C63F2B51-EFE5-2A71-3B46-FFD9F2711079}"/>
               </a:ext>
             </a:extLst>
           </p:cNvPr>
@@ -5055,112 +5010,30 @@
           <p:nvPr/>
         </p:nvCxnSpPr>
         <p:spPr>
-          <a:xfrm flipV="1">
-            <a:off x="9651746" y="1266280"/>
-            <a:ext cx="132077" cy="242720"/>
+          <a:xfrm>
+            <a:off x="9960830" y="1140803"/>
+            <a:ext cx="890924" cy="11575"/>
           </a:xfrm>
           <a:prstGeom prst="line">
             <a:avLst/>
           </a:prstGeom>
-          <a:ln>
-            <a:solidFill>
-              <a:srgbClr val="FF0000"/>
-            </a:solidFill>
-          </a:ln>
+          <a:ln/>
         </p:spPr>
         <p:style>
-          <a:lnRef idx="2">
-            <a:schemeClr val="accent1"/>
+          <a:lnRef idx="1">
+            <a:schemeClr val="dk1"/>
           </a:lnRef>
           <a:fillRef idx="0">
-            <a:schemeClr val="accent1"/>
+            <a:schemeClr val="dk1"/>
           </a:fillRef>
-          <a:effectRef idx="1">
-            <a:schemeClr val="accent1"/>
+          <a:effectRef idx="0">
+            <a:schemeClr val="dk1"/>
           </a:effectRef>
           <a:fontRef idx="minor">
             <a:schemeClr val="tx1"/>
           </a:fontRef>
         </p:style>
       </p:cxnSp>
-      <p:cxnSp>
-        <p:nvCxnSpPr>
-          <p:cNvPr id="115" name="Straight Connector 114">
-            <a:extLst>
-              <a:ext uri="{FF2B5EF4-FFF2-40B4-BE49-F238E27FC236}">
-                <a16:creationId xmlns:a16="http://schemas.microsoft.com/office/drawing/2014/main" id="{CDDF94F4-8494-9008-E4C7-58EEB448B032}"/>
-              </a:ext>
-            </a:extLst>
-          </p:cNvPr>
-          <p:cNvCxnSpPr>
-            <a:cxnSpLocks/>
-          </p:cNvCxnSpPr>
-          <p:nvPr/>
-        </p:nvCxnSpPr>
-        <p:spPr>
-          <a:xfrm flipV="1">
-            <a:off x="8826740" y="1462101"/>
-            <a:ext cx="654787" cy="824466"/>
-          </a:xfrm>
-          <a:prstGeom prst="line">
-            <a:avLst/>
-          </a:prstGeom>
-          <a:ln/>
-        </p:spPr>
-        <p:style>
-          <a:lnRef idx="1">
-            <a:schemeClr val="dk1"/>
-          </a:lnRef>
-          <a:fillRef idx="0">
-            <a:schemeClr val="dk1"/>
-          </a:fillRef>
-          <a:effectRef idx="0">
-            <a:schemeClr val="dk1"/>
-          </a:effectRef>
-          <a:fontRef idx="minor">
-            <a:schemeClr val="tx1"/>
-          </a:fontRef>
-        </p:style>
-      </p:cxnSp>
-      <p:cxnSp>
-        <p:nvCxnSpPr>
-          <p:cNvPr id="118" name="Straight Connector 117">
-            <a:extLst>
-              <a:ext uri="{FF2B5EF4-FFF2-40B4-BE49-F238E27FC236}">
-                <a16:creationId xmlns:a16="http://schemas.microsoft.com/office/drawing/2014/main" id="{C63F2B51-EFE5-2A71-3B46-FFD9F2711079}"/>
-              </a:ext>
-            </a:extLst>
-          </p:cNvPr>
-          <p:cNvCxnSpPr>
-            <a:cxnSpLocks/>
-          </p:cNvCxnSpPr>
-          <p:nvPr/>
-        </p:nvCxnSpPr>
-        <p:spPr>
-          <a:xfrm flipV="1">
-            <a:off x="7265917" y="2277522"/>
-            <a:ext cx="1560823" cy="281858"/>
-          </a:xfrm>
-          <a:prstGeom prst="line">
-            <a:avLst/>
-          </a:prstGeom>
-          <a:ln/>
-        </p:spPr>
-        <p:style>
-          <a:lnRef idx="1">
-            <a:schemeClr val="dk1"/>
-          </a:lnRef>
-          <a:fillRef idx="0">
-            <a:schemeClr val="dk1"/>
-          </a:fillRef>
-          <a:effectRef idx="0">
-            <a:schemeClr val="dk1"/>
-          </a:effectRef>
-          <a:fontRef idx="minor">
-            <a:schemeClr val="tx1"/>
-          </a:fontRef>
-        </p:style>
-      </p:cxnSp>
       <p:sp>
         <p:nvSpPr>
           <p:cNvPr id="121" name="TextBox 120">
@@ -5175,7 +5048,7 @@
         </p:nvSpPr>
         <p:spPr>
           <a:xfrm rot="19901181">
-            <a:off x="9592227" y="627903"/>
+            <a:off x="8814203" y="1063143"/>
             <a:ext cx="475079" cy="276999"/>
           </a:xfrm>
           <a:prstGeom prst="rect">
@@ -5211,7 +5084,7 @@
         </p:nvSpPr>
         <p:spPr>
           <a:xfrm rot="19682730">
-            <a:off x="8837344" y="1076244"/>
+            <a:off x="9556327" y="610874"/>
             <a:ext cx="475079" cy="276999"/>
           </a:xfrm>
           <a:prstGeom prst="rect">
@@ -5331,8 +5204,8 @@
         </p:nvSpPr>
         <p:spPr>
           <a:xfrm>
-            <a:off x="3291049" y="4818161"/>
-            <a:ext cx="1150390" cy="307777"/>
+            <a:off x="3087232" y="4818161"/>
+            <a:ext cx="1354207" cy="307777"/>
           </a:xfrm>
           <a:prstGeom prst="rect">
             <a:avLst/>
@@ -5365,7 +5238,7 @@
             <a:pPr algn="ctr"/>
             <a:r>
               <a:rPr lang="en-GB" sz="1400" dirty="0"/>
-              <a:t>Motor signal</a:t>
+              <a:t>Motor L signal</a:t>
             </a:r>
           </a:p>
         </p:txBody>
@@ -5384,8 +5257,8 @@
         </p:nvSpPr>
         <p:spPr>
           <a:xfrm>
-            <a:off x="3331230" y="3964721"/>
-            <a:ext cx="1150390" cy="307777"/>
+            <a:off x="3127413" y="3964721"/>
+            <a:ext cx="1354207" cy="307777"/>
           </a:xfrm>
           <a:prstGeom prst="rect">
             <a:avLst/>
@@ -5418,7 +5291,98 @@
             <a:pPr algn="ctr"/>
             <a:r>
               <a:rPr lang="en-GB" sz="1400" dirty="0"/>
-              <a:t>Motor signal</a:t>
+              <a:t>Motor R signal</a:t>
+            </a:r>
+          </a:p>
+        </p:txBody>
+      </p:sp>
+      <p:cxnSp>
+        <p:nvCxnSpPr>
+          <p:cNvPr id="11" name="Straight Connector 10">
+            <a:extLst>
+              <a:ext uri="{FF2B5EF4-FFF2-40B4-BE49-F238E27FC236}">
+                <a16:creationId xmlns:a16="http://schemas.microsoft.com/office/drawing/2014/main" id="{CE4BE920-66F8-589E-C6ED-BB9960F1A60D}"/>
+              </a:ext>
+            </a:extLst>
+          </p:cNvPr>
+          <p:cNvCxnSpPr>
+            <a:cxnSpLocks/>
+            <a:endCxn id="106" idx="2"/>
+          </p:cNvCxnSpPr>
+          <p:nvPr/>
+        </p:nvCxnSpPr>
+        <p:spPr>
+          <a:xfrm flipH="1" flipV="1">
+            <a:off x="9673232" y="1331432"/>
+            <a:ext cx="295838" cy="77430"/>
+          </a:xfrm>
+          <a:prstGeom prst="line">
+            <a:avLst/>
+          </a:prstGeom>
+          <a:ln>
+            <a:solidFill>
+              <a:srgbClr val="FF0000"/>
+            </a:solidFill>
+          </a:ln>
+        </p:spPr>
+        <p:style>
+          <a:lnRef idx="2">
+            <a:schemeClr val="accent1"/>
+          </a:lnRef>
+          <a:fillRef idx="0">
+            <a:schemeClr val="accent1"/>
+          </a:fillRef>
+          <a:effectRef idx="1">
+            <a:schemeClr val="accent1"/>
+          </a:effectRef>
+          <a:fontRef idx="minor">
+            <a:schemeClr val="tx1"/>
+          </a:fontRef>
+        </p:style>
+      </p:cxnSp>
+      <p:sp>
+        <p:nvSpPr>
+          <p:cNvPr id="106" name="Rectangle: Rounded Corners 105">
+            <a:extLst>
+              <a:ext uri="{FF2B5EF4-FFF2-40B4-BE49-F238E27FC236}">
+                <a16:creationId xmlns:a16="http://schemas.microsoft.com/office/drawing/2014/main" id="{8F0EA6D2-09EC-AC96-612C-B90D33EC8D32}"/>
+              </a:ext>
+            </a:extLst>
+          </p:cNvPr>
+          <p:cNvSpPr/>
+          <p:nvPr/>
+        </p:nvSpPr>
+        <p:spPr>
+          <a:xfrm rot="19735144">
+            <a:off x="9220788" y="1034734"/>
+            <a:ext cx="739874" cy="319642"/>
+          </a:xfrm>
+          <a:prstGeom prst="roundRect">
+            <a:avLst/>
+          </a:prstGeom>
+        </p:spPr>
+        <p:style>
+          <a:lnRef idx="2">
+            <a:schemeClr val="dk1"/>
+          </a:lnRef>
+          <a:fillRef idx="1">
+            <a:schemeClr val="lt1"/>
+          </a:fillRef>
+          <a:effectRef idx="0">
+            <a:schemeClr val="dk1"/>
+          </a:effectRef>
+          <a:fontRef idx="minor">
+            <a:schemeClr val="dk1"/>
+          </a:fontRef>
+        </p:style>
+        <p:txBody>
+          <a:bodyPr rtlCol="0" anchor="ctr"/>
+          <a:lstStyle/>
+          <a:p>
+            <a:pPr algn="ctr"/>
+            <a:r>
+              <a:rPr lang="en-GB" sz="1400" dirty="0"/>
+              <a:t>Switch</a:t>
             </a:r>
           </a:p>
         </p:txBody>
@@ -5427,6 +5391,2663 @@
     <p:extLst>
       <p:ext uri="{BB962C8B-B14F-4D97-AF65-F5344CB8AC3E}">
         <p14:creationId xmlns:p14="http://schemas.microsoft.com/office/powerpoint/2010/main" val="4108247512"/>
+      </p:ext>
+    </p:extLst>
+  </p:cSld>
+  <p:clrMapOvr>
+    <a:masterClrMapping/>
+  </p:clrMapOvr>
+</p:sld>
+</file>
+
+<file path=ppt/slides/slide2.xml><?xml version="1.0" encoding="utf-8"?>
+<p:sld xmlns:a="http://schemas.openxmlformats.org/drawingml/2006/main" xmlns:r="http://schemas.openxmlformats.org/officeDocument/2006/relationships" xmlns:p="http://schemas.openxmlformats.org/presentationml/2006/main">
+  <p:cSld>
+    <p:spTree>
+      <p:nvGrpSpPr>
+        <p:cNvPr id="1" name=""/>
+        <p:cNvGrpSpPr/>
+        <p:nvPr/>
+      </p:nvGrpSpPr>
+      <p:grpSpPr>
+        <a:xfrm>
+          <a:off x="0" y="0"/>
+          <a:ext cx="0" cy="0"/>
+          <a:chOff x="0" y="0"/>
+          <a:chExt cx="0" cy="0"/>
+        </a:xfrm>
+      </p:grpSpPr>
+      <p:sp>
+        <p:nvSpPr>
+          <p:cNvPr id="2" name="Rectangle: Rounded Corners 1">
+            <a:extLst>
+              <a:ext uri="{FF2B5EF4-FFF2-40B4-BE49-F238E27FC236}">
+                <a16:creationId xmlns:a16="http://schemas.microsoft.com/office/drawing/2014/main" id="{DC54F66E-5B32-79CE-6978-BFF4CA8074DE}"/>
+              </a:ext>
+            </a:extLst>
+          </p:cNvPr>
+          <p:cNvSpPr/>
+          <p:nvPr/>
+        </p:nvSpPr>
+        <p:spPr>
+          <a:xfrm>
+            <a:off x="7681232" y="2527365"/>
+            <a:ext cx="2725093" cy="1285592"/>
+          </a:xfrm>
+          <a:prstGeom prst="roundRect">
+            <a:avLst/>
+          </a:prstGeom>
+        </p:spPr>
+        <p:style>
+          <a:lnRef idx="2">
+            <a:schemeClr val="dk1"/>
+          </a:lnRef>
+          <a:fillRef idx="1">
+            <a:schemeClr val="lt1"/>
+          </a:fillRef>
+          <a:effectRef idx="0">
+            <a:schemeClr val="dk1"/>
+          </a:effectRef>
+          <a:fontRef idx="minor">
+            <a:schemeClr val="dk1"/>
+          </a:fontRef>
+        </p:style>
+        <p:txBody>
+          <a:bodyPr rtlCol="0" anchor="ctr"/>
+          <a:lstStyle/>
+          <a:p>
+            <a:pPr algn="ctr"/>
+            <a:r>
+              <a:rPr lang="en-GB" dirty="0"/>
+              <a:t>L293D H-bridge</a:t>
+            </a:r>
+          </a:p>
+        </p:txBody>
+      </p:sp>
+      <p:sp>
+        <p:nvSpPr>
+          <p:cNvPr id="3" name="Oval 2">
+            <a:extLst>
+              <a:ext uri="{FF2B5EF4-FFF2-40B4-BE49-F238E27FC236}">
+                <a16:creationId xmlns:a16="http://schemas.microsoft.com/office/drawing/2014/main" id="{A3CE02A0-6944-9BED-AF2D-A96A3F8381F3}"/>
+              </a:ext>
+            </a:extLst>
+          </p:cNvPr>
+          <p:cNvSpPr/>
+          <p:nvPr/>
+        </p:nvSpPr>
+        <p:spPr>
+          <a:xfrm>
+            <a:off x="7537232" y="3026161"/>
+            <a:ext cx="288000" cy="288000"/>
+          </a:xfrm>
+          <a:prstGeom prst="ellipse">
+            <a:avLst/>
+          </a:prstGeom>
+        </p:spPr>
+        <p:style>
+          <a:lnRef idx="2">
+            <a:schemeClr val="dk1">
+              <a:shade val="15000"/>
+            </a:schemeClr>
+          </a:lnRef>
+          <a:fillRef idx="1">
+            <a:schemeClr val="dk1"/>
+          </a:fillRef>
+          <a:effectRef idx="0">
+            <a:schemeClr val="dk1"/>
+          </a:effectRef>
+          <a:fontRef idx="minor">
+            <a:schemeClr val="lt1"/>
+          </a:fontRef>
+        </p:style>
+        <p:txBody>
+          <a:bodyPr rtlCol="0" anchor="ctr"/>
+          <a:lstStyle/>
+          <a:p>
+            <a:pPr algn="ctr"/>
+            <a:endParaRPr lang="en-GB"/>
+          </a:p>
+        </p:txBody>
+      </p:sp>
+      <p:sp>
+        <p:nvSpPr>
+          <p:cNvPr id="4" name="Rectangle 3">
+            <a:extLst>
+              <a:ext uri="{FF2B5EF4-FFF2-40B4-BE49-F238E27FC236}">
+                <a16:creationId xmlns:a16="http://schemas.microsoft.com/office/drawing/2014/main" id="{CADF3CF1-25A5-FA86-1CD3-168D94E1A799}"/>
+              </a:ext>
+            </a:extLst>
+          </p:cNvPr>
+          <p:cNvSpPr/>
+          <p:nvPr/>
+        </p:nvSpPr>
+        <p:spPr>
+          <a:xfrm>
+            <a:off x="7092756" y="2925718"/>
+            <a:ext cx="570392" cy="534154"/>
+          </a:xfrm>
+          <a:prstGeom prst="rect">
+            <a:avLst/>
+          </a:prstGeom>
+          <a:ln>
+            <a:solidFill>
+              <a:schemeClr val="bg1"/>
+            </a:solidFill>
+          </a:ln>
+        </p:spPr>
+        <p:style>
+          <a:lnRef idx="2">
+            <a:schemeClr val="dk1"/>
+          </a:lnRef>
+          <a:fillRef idx="1">
+            <a:schemeClr val="lt1"/>
+          </a:fillRef>
+          <a:effectRef idx="0">
+            <a:schemeClr val="dk1"/>
+          </a:effectRef>
+          <a:fontRef idx="minor">
+            <a:schemeClr val="dk1"/>
+          </a:fontRef>
+        </p:style>
+        <p:txBody>
+          <a:bodyPr rtlCol="0" anchor="ctr"/>
+          <a:lstStyle/>
+          <a:p>
+            <a:pPr algn="ctr"/>
+            <a:endParaRPr lang="en-GB"/>
+          </a:p>
+        </p:txBody>
+      </p:sp>
+      <p:sp>
+        <p:nvSpPr>
+          <p:cNvPr id="5" name="TextBox 4">
+            <a:extLst>
+              <a:ext uri="{FF2B5EF4-FFF2-40B4-BE49-F238E27FC236}">
+                <a16:creationId xmlns:a16="http://schemas.microsoft.com/office/drawing/2014/main" id="{78DA1679-ED3D-7C4D-50F9-5C7CAC0EC6A5}"/>
+              </a:ext>
+            </a:extLst>
+          </p:cNvPr>
+          <p:cNvSpPr txBox="1"/>
+          <p:nvPr/>
+        </p:nvSpPr>
+        <p:spPr>
+          <a:xfrm>
+            <a:off x="7681232" y="3575304"/>
+            <a:ext cx="426720" cy="261610"/>
+          </a:xfrm>
+          <a:prstGeom prst="rect">
+            <a:avLst/>
+          </a:prstGeom>
+          <a:noFill/>
+        </p:spPr>
+        <p:txBody>
+          <a:bodyPr wrap="square" rtlCol="0">
+            <a:spAutoFit/>
+          </a:bodyPr>
+          <a:lstStyle/>
+          <a:p>
+            <a:pPr algn="ctr"/>
+            <a:r>
+              <a:rPr lang="en-GB" sz="1100" b="1" dirty="0"/>
+              <a:t>E1</a:t>
+            </a:r>
+          </a:p>
+        </p:txBody>
+      </p:sp>
+      <p:sp>
+        <p:nvSpPr>
+          <p:cNvPr id="6" name="TextBox 5">
+            <a:extLst>
+              <a:ext uri="{FF2B5EF4-FFF2-40B4-BE49-F238E27FC236}">
+                <a16:creationId xmlns:a16="http://schemas.microsoft.com/office/drawing/2014/main" id="{ED7BD71C-90D2-2097-6018-EFCD00DE99E4}"/>
+              </a:ext>
+            </a:extLst>
+          </p:cNvPr>
+          <p:cNvSpPr txBox="1"/>
+          <p:nvPr/>
+        </p:nvSpPr>
+        <p:spPr>
+          <a:xfrm>
+            <a:off x="9906272" y="2527365"/>
+            <a:ext cx="426720" cy="261610"/>
+          </a:xfrm>
+          <a:prstGeom prst="rect">
+            <a:avLst/>
+          </a:prstGeom>
+          <a:noFill/>
+        </p:spPr>
+        <p:txBody>
+          <a:bodyPr wrap="square" rtlCol="0">
+            <a:spAutoFit/>
+          </a:bodyPr>
+          <a:lstStyle/>
+          <a:p>
+            <a:pPr algn="ctr"/>
+            <a:r>
+              <a:rPr lang="en-GB" sz="1100" b="1" dirty="0"/>
+              <a:t>E2</a:t>
+            </a:r>
+          </a:p>
+        </p:txBody>
+      </p:sp>
+      <p:sp>
+        <p:nvSpPr>
+          <p:cNvPr id="7" name="TextBox 6">
+            <a:extLst>
+              <a:ext uri="{FF2B5EF4-FFF2-40B4-BE49-F238E27FC236}">
+                <a16:creationId xmlns:a16="http://schemas.microsoft.com/office/drawing/2014/main" id="{A8FCCBBA-94E5-403F-08E4-A215B97FF873}"/>
+              </a:ext>
+            </a:extLst>
+          </p:cNvPr>
+          <p:cNvSpPr txBox="1"/>
+          <p:nvPr/>
+        </p:nvSpPr>
+        <p:spPr>
+          <a:xfrm>
+            <a:off x="9906272" y="3575304"/>
+            <a:ext cx="426720" cy="261610"/>
+          </a:xfrm>
+          <a:prstGeom prst="rect">
+            <a:avLst/>
+          </a:prstGeom>
+          <a:noFill/>
+        </p:spPr>
+        <p:txBody>
+          <a:bodyPr wrap="square" rtlCol="0">
+            <a:spAutoFit/>
+          </a:bodyPr>
+          <a:lstStyle/>
+          <a:p>
+            <a:pPr algn="ctr"/>
+            <a:r>
+              <a:rPr lang="en-GB" sz="1100" b="1" dirty="0"/>
+              <a:t>V</a:t>
+            </a:r>
+            <a:r>
+              <a:rPr lang="en-GB" sz="1100" b="1" baseline="-25000" dirty="0"/>
+              <a:t>S</a:t>
+            </a:r>
+            <a:endParaRPr lang="en-GB" sz="1100" b="1" dirty="0"/>
+          </a:p>
+        </p:txBody>
+      </p:sp>
+      <p:sp>
+        <p:nvSpPr>
+          <p:cNvPr id="8" name="TextBox 7">
+            <a:extLst>
+              <a:ext uri="{FF2B5EF4-FFF2-40B4-BE49-F238E27FC236}">
+                <a16:creationId xmlns:a16="http://schemas.microsoft.com/office/drawing/2014/main" id="{B0141EA3-1726-E5CE-DD15-11DD39C5EB4D}"/>
+              </a:ext>
+            </a:extLst>
+          </p:cNvPr>
+          <p:cNvSpPr txBox="1"/>
+          <p:nvPr/>
+        </p:nvSpPr>
+        <p:spPr>
+          <a:xfrm>
+            <a:off x="7686461" y="2527365"/>
+            <a:ext cx="426720" cy="261610"/>
+          </a:xfrm>
+          <a:prstGeom prst="rect">
+            <a:avLst/>
+          </a:prstGeom>
+          <a:noFill/>
+        </p:spPr>
+        <p:txBody>
+          <a:bodyPr wrap="square" rtlCol="0">
+            <a:spAutoFit/>
+          </a:bodyPr>
+          <a:lstStyle/>
+          <a:p>
+            <a:pPr algn="ctr"/>
+            <a:r>
+              <a:rPr lang="en-GB" sz="1100" b="1" dirty="0"/>
+              <a:t>V</a:t>
+            </a:r>
+            <a:r>
+              <a:rPr lang="en-GB" sz="1100" b="1" baseline="-25000" dirty="0"/>
+              <a:t>SS</a:t>
+            </a:r>
+            <a:endParaRPr lang="en-GB" sz="1100" b="1" dirty="0"/>
+          </a:p>
+        </p:txBody>
+      </p:sp>
+      <p:sp>
+        <p:nvSpPr>
+          <p:cNvPr id="9" name="TextBox 8">
+            <a:extLst>
+              <a:ext uri="{FF2B5EF4-FFF2-40B4-BE49-F238E27FC236}">
+                <a16:creationId xmlns:a16="http://schemas.microsoft.com/office/drawing/2014/main" id="{016BD353-95E5-4118-6CA7-A576315E44D2}"/>
+              </a:ext>
+            </a:extLst>
+          </p:cNvPr>
+          <p:cNvSpPr txBox="1"/>
+          <p:nvPr/>
+        </p:nvSpPr>
+        <p:spPr>
+          <a:xfrm>
+            <a:off x="8617058" y="2527365"/>
+            <a:ext cx="426720" cy="261610"/>
+          </a:xfrm>
+          <a:prstGeom prst="rect">
+            <a:avLst/>
+          </a:prstGeom>
+          <a:noFill/>
+        </p:spPr>
+        <p:txBody>
+          <a:bodyPr wrap="square" rtlCol="0">
+            <a:spAutoFit/>
+          </a:bodyPr>
+          <a:lstStyle/>
+          <a:p>
+            <a:pPr algn="ctr"/>
+            <a:r>
+              <a:rPr lang="en-GB" sz="1100" b="1" dirty="0"/>
+              <a:t>G</a:t>
+            </a:r>
+          </a:p>
+        </p:txBody>
+      </p:sp>
+      <p:sp>
+        <p:nvSpPr>
+          <p:cNvPr id="10" name="TextBox 9">
+            <a:extLst>
+              <a:ext uri="{FF2B5EF4-FFF2-40B4-BE49-F238E27FC236}">
+                <a16:creationId xmlns:a16="http://schemas.microsoft.com/office/drawing/2014/main" id="{CEF769B4-2FF2-9160-CDEA-51D592B714E1}"/>
+              </a:ext>
+            </a:extLst>
+          </p:cNvPr>
+          <p:cNvSpPr txBox="1"/>
+          <p:nvPr/>
+        </p:nvSpPr>
+        <p:spPr>
+          <a:xfrm>
+            <a:off x="8290078" y="2527365"/>
+            <a:ext cx="426720" cy="261610"/>
+          </a:xfrm>
+          <a:prstGeom prst="rect">
+            <a:avLst/>
+          </a:prstGeom>
+          <a:noFill/>
+        </p:spPr>
+        <p:txBody>
+          <a:bodyPr wrap="square" rtlCol="0">
+            <a:spAutoFit/>
+          </a:bodyPr>
+          <a:lstStyle/>
+          <a:p>
+            <a:pPr algn="ctr"/>
+            <a:r>
+              <a:rPr lang="en-GB" sz="1100" b="1" dirty="0"/>
+              <a:t>O4</a:t>
+            </a:r>
+          </a:p>
+        </p:txBody>
+      </p:sp>
+      <p:sp>
+        <p:nvSpPr>
+          <p:cNvPr id="11" name="TextBox 10">
+            <a:extLst>
+              <a:ext uri="{FF2B5EF4-FFF2-40B4-BE49-F238E27FC236}">
+                <a16:creationId xmlns:a16="http://schemas.microsoft.com/office/drawing/2014/main" id="{5AA4FA11-85D1-0C8F-F167-6D89CD2D3F81}"/>
+              </a:ext>
+            </a:extLst>
+          </p:cNvPr>
+          <p:cNvSpPr txBox="1"/>
+          <p:nvPr/>
+        </p:nvSpPr>
+        <p:spPr>
+          <a:xfrm>
+            <a:off x="7972451" y="2527365"/>
+            <a:ext cx="426720" cy="261610"/>
+          </a:xfrm>
+          <a:prstGeom prst="rect">
+            <a:avLst/>
+          </a:prstGeom>
+          <a:noFill/>
+        </p:spPr>
+        <p:txBody>
+          <a:bodyPr wrap="square" rtlCol="0">
+            <a:spAutoFit/>
+          </a:bodyPr>
+          <a:lstStyle/>
+          <a:p>
+            <a:pPr algn="ctr"/>
+            <a:r>
+              <a:rPr lang="en-GB" sz="1100" b="1" dirty="0"/>
+              <a:t>I4</a:t>
+            </a:r>
+          </a:p>
+        </p:txBody>
+      </p:sp>
+      <p:sp>
+        <p:nvSpPr>
+          <p:cNvPr id="12" name="TextBox 11">
+            <a:extLst>
+              <a:ext uri="{FF2B5EF4-FFF2-40B4-BE49-F238E27FC236}">
+                <a16:creationId xmlns:a16="http://schemas.microsoft.com/office/drawing/2014/main" id="{66C1035F-49C0-3B6F-217D-222B263924D5}"/>
+              </a:ext>
+            </a:extLst>
+          </p:cNvPr>
+          <p:cNvSpPr txBox="1"/>
+          <p:nvPr/>
+        </p:nvSpPr>
+        <p:spPr>
+          <a:xfrm>
+            <a:off x="8617058" y="3575304"/>
+            <a:ext cx="426720" cy="261610"/>
+          </a:xfrm>
+          <a:prstGeom prst="rect">
+            <a:avLst/>
+          </a:prstGeom>
+          <a:noFill/>
+        </p:spPr>
+        <p:txBody>
+          <a:bodyPr wrap="square" rtlCol="0">
+            <a:spAutoFit/>
+          </a:bodyPr>
+          <a:lstStyle/>
+          <a:p>
+            <a:pPr algn="ctr"/>
+            <a:r>
+              <a:rPr lang="en-GB" sz="1100" b="1" dirty="0"/>
+              <a:t>G</a:t>
+            </a:r>
+          </a:p>
+        </p:txBody>
+      </p:sp>
+      <p:sp>
+        <p:nvSpPr>
+          <p:cNvPr id="13" name="TextBox 12">
+            <a:extLst>
+              <a:ext uri="{FF2B5EF4-FFF2-40B4-BE49-F238E27FC236}">
+                <a16:creationId xmlns:a16="http://schemas.microsoft.com/office/drawing/2014/main" id="{8F622A9F-9A7D-E697-4C8E-B839308BEDAC}"/>
+              </a:ext>
+            </a:extLst>
+          </p:cNvPr>
+          <p:cNvSpPr txBox="1"/>
+          <p:nvPr/>
+        </p:nvSpPr>
+        <p:spPr>
+          <a:xfrm>
+            <a:off x="8290078" y="3575304"/>
+            <a:ext cx="426720" cy="261610"/>
+          </a:xfrm>
+          <a:prstGeom prst="rect">
+            <a:avLst/>
+          </a:prstGeom>
+          <a:noFill/>
+        </p:spPr>
+        <p:txBody>
+          <a:bodyPr wrap="square" rtlCol="0">
+            <a:spAutoFit/>
+          </a:bodyPr>
+          <a:lstStyle/>
+          <a:p>
+            <a:pPr algn="ctr"/>
+            <a:r>
+              <a:rPr lang="en-GB" sz="1100" b="1" dirty="0"/>
+              <a:t>O1</a:t>
+            </a:r>
+          </a:p>
+        </p:txBody>
+      </p:sp>
+      <p:sp>
+        <p:nvSpPr>
+          <p:cNvPr id="14" name="TextBox 13">
+            <a:extLst>
+              <a:ext uri="{FF2B5EF4-FFF2-40B4-BE49-F238E27FC236}">
+                <a16:creationId xmlns:a16="http://schemas.microsoft.com/office/drawing/2014/main" id="{41295D7F-364A-B103-6C05-F1A04D22D4A6}"/>
+              </a:ext>
+            </a:extLst>
+          </p:cNvPr>
+          <p:cNvSpPr txBox="1"/>
+          <p:nvPr/>
+        </p:nvSpPr>
+        <p:spPr>
+          <a:xfrm>
+            <a:off x="7972451" y="3575304"/>
+            <a:ext cx="426720" cy="261610"/>
+          </a:xfrm>
+          <a:prstGeom prst="rect">
+            <a:avLst/>
+          </a:prstGeom>
+          <a:noFill/>
+        </p:spPr>
+        <p:txBody>
+          <a:bodyPr wrap="square" rtlCol="0">
+            <a:spAutoFit/>
+          </a:bodyPr>
+          <a:lstStyle/>
+          <a:p>
+            <a:pPr algn="ctr"/>
+            <a:r>
+              <a:rPr lang="en-GB" sz="1100" b="1" dirty="0"/>
+              <a:t>I1</a:t>
+            </a:r>
+          </a:p>
+        </p:txBody>
+      </p:sp>
+      <p:sp>
+        <p:nvSpPr>
+          <p:cNvPr id="15" name="TextBox 14">
+            <a:extLst>
+              <a:ext uri="{FF2B5EF4-FFF2-40B4-BE49-F238E27FC236}">
+                <a16:creationId xmlns:a16="http://schemas.microsoft.com/office/drawing/2014/main" id="{4150AB2D-7096-D9E8-FF44-BA755401875B}"/>
+              </a:ext>
+            </a:extLst>
+          </p:cNvPr>
+          <p:cNvSpPr txBox="1"/>
+          <p:nvPr/>
+        </p:nvSpPr>
+        <p:spPr>
+          <a:xfrm>
+            <a:off x="9607432" y="3575304"/>
+            <a:ext cx="426720" cy="261610"/>
+          </a:xfrm>
+          <a:prstGeom prst="rect">
+            <a:avLst/>
+          </a:prstGeom>
+          <a:noFill/>
+        </p:spPr>
+        <p:txBody>
+          <a:bodyPr wrap="square" rtlCol="0">
+            <a:spAutoFit/>
+          </a:bodyPr>
+          <a:lstStyle/>
+          <a:p>
+            <a:pPr algn="ctr"/>
+            <a:r>
+              <a:rPr lang="en-GB" sz="1100" b="1" dirty="0"/>
+              <a:t>I2</a:t>
+            </a:r>
+          </a:p>
+        </p:txBody>
+      </p:sp>
+      <p:sp>
+        <p:nvSpPr>
+          <p:cNvPr id="16" name="TextBox 15">
+            <a:extLst>
+              <a:ext uri="{FF2B5EF4-FFF2-40B4-BE49-F238E27FC236}">
+                <a16:creationId xmlns:a16="http://schemas.microsoft.com/office/drawing/2014/main" id="{F52D37A3-E653-2DCD-F4E7-342801618947}"/>
+              </a:ext>
+            </a:extLst>
+          </p:cNvPr>
+          <p:cNvSpPr txBox="1"/>
+          <p:nvPr/>
+        </p:nvSpPr>
+        <p:spPr>
+          <a:xfrm>
+            <a:off x="9280452" y="3575304"/>
+            <a:ext cx="426720" cy="261610"/>
+          </a:xfrm>
+          <a:prstGeom prst="rect">
+            <a:avLst/>
+          </a:prstGeom>
+          <a:noFill/>
+        </p:spPr>
+        <p:txBody>
+          <a:bodyPr wrap="square" rtlCol="0">
+            <a:spAutoFit/>
+          </a:bodyPr>
+          <a:lstStyle/>
+          <a:p>
+            <a:pPr algn="ctr"/>
+            <a:r>
+              <a:rPr lang="en-GB" sz="1100" b="1" dirty="0"/>
+              <a:t>O2</a:t>
+            </a:r>
+          </a:p>
+        </p:txBody>
+      </p:sp>
+      <p:sp>
+        <p:nvSpPr>
+          <p:cNvPr id="17" name="TextBox 16">
+            <a:extLst>
+              <a:ext uri="{FF2B5EF4-FFF2-40B4-BE49-F238E27FC236}">
+                <a16:creationId xmlns:a16="http://schemas.microsoft.com/office/drawing/2014/main" id="{4B4DFC84-1A8D-879E-3589-8ED2CD3958D8}"/>
+              </a:ext>
+            </a:extLst>
+          </p:cNvPr>
+          <p:cNvSpPr txBox="1"/>
+          <p:nvPr/>
+        </p:nvSpPr>
+        <p:spPr>
+          <a:xfrm>
+            <a:off x="8962825" y="3575304"/>
+            <a:ext cx="426720" cy="261610"/>
+          </a:xfrm>
+          <a:prstGeom prst="rect">
+            <a:avLst/>
+          </a:prstGeom>
+          <a:noFill/>
+        </p:spPr>
+        <p:txBody>
+          <a:bodyPr wrap="square" rtlCol="0">
+            <a:spAutoFit/>
+          </a:bodyPr>
+          <a:lstStyle/>
+          <a:p>
+            <a:pPr algn="ctr"/>
+            <a:r>
+              <a:rPr lang="en-GB" sz="1100" b="1" dirty="0"/>
+              <a:t>G</a:t>
+            </a:r>
+          </a:p>
+        </p:txBody>
+      </p:sp>
+      <p:sp>
+        <p:nvSpPr>
+          <p:cNvPr id="18" name="TextBox 17">
+            <a:extLst>
+              <a:ext uri="{FF2B5EF4-FFF2-40B4-BE49-F238E27FC236}">
+                <a16:creationId xmlns:a16="http://schemas.microsoft.com/office/drawing/2014/main" id="{F802952E-79EB-0B73-352F-221495A44C7C}"/>
+              </a:ext>
+            </a:extLst>
+          </p:cNvPr>
+          <p:cNvSpPr txBox="1"/>
+          <p:nvPr/>
+        </p:nvSpPr>
+        <p:spPr>
+          <a:xfrm>
+            <a:off x="9620282" y="2527365"/>
+            <a:ext cx="426720" cy="261610"/>
+          </a:xfrm>
+          <a:prstGeom prst="rect">
+            <a:avLst/>
+          </a:prstGeom>
+          <a:noFill/>
+        </p:spPr>
+        <p:txBody>
+          <a:bodyPr wrap="square" rtlCol="0">
+            <a:spAutoFit/>
+          </a:bodyPr>
+          <a:lstStyle/>
+          <a:p>
+            <a:pPr algn="ctr"/>
+            <a:r>
+              <a:rPr lang="en-GB" sz="1100" b="1" dirty="0"/>
+              <a:t>I3</a:t>
+            </a:r>
+          </a:p>
+        </p:txBody>
+      </p:sp>
+      <p:sp>
+        <p:nvSpPr>
+          <p:cNvPr id="19" name="TextBox 18">
+            <a:extLst>
+              <a:ext uri="{FF2B5EF4-FFF2-40B4-BE49-F238E27FC236}">
+                <a16:creationId xmlns:a16="http://schemas.microsoft.com/office/drawing/2014/main" id="{EA00FA4F-EF35-6C8C-885A-99F93E78F9E1}"/>
+              </a:ext>
+            </a:extLst>
+          </p:cNvPr>
+          <p:cNvSpPr txBox="1"/>
+          <p:nvPr/>
+        </p:nvSpPr>
+        <p:spPr>
+          <a:xfrm>
+            <a:off x="9293302" y="2527365"/>
+            <a:ext cx="426720" cy="261610"/>
+          </a:xfrm>
+          <a:prstGeom prst="rect">
+            <a:avLst/>
+          </a:prstGeom>
+          <a:noFill/>
+        </p:spPr>
+        <p:txBody>
+          <a:bodyPr wrap="square" rtlCol="0">
+            <a:spAutoFit/>
+          </a:bodyPr>
+          <a:lstStyle/>
+          <a:p>
+            <a:pPr algn="ctr"/>
+            <a:r>
+              <a:rPr lang="en-GB" sz="1100" b="1" dirty="0"/>
+              <a:t>O3</a:t>
+            </a:r>
+          </a:p>
+        </p:txBody>
+      </p:sp>
+      <p:sp>
+        <p:nvSpPr>
+          <p:cNvPr id="20" name="TextBox 19">
+            <a:extLst>
+              <a:ext uri="{FF2B5EF4-FFF2-40B4-BE49-F238E27FC236}">
+                <a16:creationId xmlns:a16="http://schemas.microsoft.com/office/drawing/2014/main" id="{E62EB3D6-2BB7-68B5-A2C1-DEF791CBD29A}"/>
+              </a:ext>
+            </a:extLst>
+          </p:cNvPr>
+          <p:cNvSpPr txBox="1"/>
+          <p:nvPr/>
+        </p:nvSpPr>
+        <p:spPr>
+          <a:xfrm>
+            <a:off x="8975675" y="2527365"/>
+            <a:ext cx="426720" cy="261610"/>
+          </a:xfrm>
+          <a:prstGeom prst="rect">
+            <a:avLst/>
+          </a:prstGeom>
+          <a:noFill/>
+        </p:spPr>
+        <p:txBody>
+          <a:bodyPr wrap="square" rtlCol="0">
+            <a:spAutoFit/>
+          </a:bodyPr>
+          <a:lstStyle/>
+          <a:p>
+            <a:pPr algn="ctr"/>
+            <a:r>
+              <a:rPr lang="en-GB" sz="1100" b="1" dirty="0"/>
+              <a:t>G</a:t>
+            </a:r>
+          </a:p>
+        </p:txBody>
+      </p:sp>
+      <p:sp>
+        <p:nvSpPr>
+          <p:cNvPr id="21" name="TextBox 20">
+            <a:extLst>
+              <a:ext uri="{FF2B5EF4-FFF2-40B4-BE49-F238E27FC236}">
+                <a16:creationId xmlns:a16="http://schemas.microsoft.com/office/drawing/2014/main" id="{2DFE1C96-6264-9B29-CDA6-C44D861530C6}"/>
+              </a:ext>
+            </a:extLst>
+          </p:cNvPr>
+          <p:cNvSpPr txBox="1"/>
+          <p:nvPr/>
+        </p:nvSpPr>
+        <p:spPr>
+          <a:xfrm rot="16200000">
+            <a:off x="8251999" y="4807267"/>
+            <a:ext cx="1492050" cy="307777"/>
+          </a:xfrm>
+          <a:prstGeom prst="rect">
+            <a:avLst/>
+          </a:prstGeom>
+          <a:noFill/>
+        </p:spPr>
+        <p:txBody>
+          <a:bodyPr wrap="square" rtlCol="0">
+            <a:spAutoFit/>
+          </a:bodyPr>
+          <a:lstStyle/>
+          <a:p>
+            <a:r>
+              <a:rPr lang="en-GB" sz="1400" dirty="0"/>
+              <a:t>Big breadboard -</a:t>
+            </a:r>
+          </a:p>
+        </p:txBody>
+      </p:sp>
+      <p:sp>
+        <p:nvSpPr>
+          <p:cNvPr id="22" name="TextBox 21">
+            <a:extLst>
+              <a:ext uri="{FF2B5EF4-FFF2-40B4-BE49-F238E27FC236}">
+                <a16:creationId xmlns:a16="http://schemas.microsoft.com/office/drawing/2014/main" id="{6BB525C9-53A5-563F-8294-65BC2DFB335F}"/>
+              </a:ext>
+            </a:extLst>
+          </p:cNvPr>
+          <p:cNvSpPr txBox="1"/>
+          <p:nvPr/>
+        </p:nvSpPr>
+        <p:spPr>
+          <a:xfrm rot="5400000">
+            <a:off x="8274925" y="1438344"/>
+            <a:ext cx="1492050" cy="307777"/>
+          </a:xfrm>
+          <a:prstGeom prst="rect">
+            <a:avLst/>
+          </a:prstGeom>
+          <a:noFill/>
+        </p:spPr>
+        <p:txBody>
+          <a:bodyPr wrap="square" rtlCol="0">
+            <a:spAutoFit/>
+          </a:bodyPr>
+          <a:lstStyle/>
+          <a:p>
+            <a:r>
+              <a:rPr lang="en-GB" sz="1400" dirty="0"/>
+              <a:t>Big breadboard -</a:t>
+            </a:r>
+          </a:p>
+        </p:txBody>
+      </p:sp>
+      <p:cxnSp>
+        <p:nvCxnSpPr>
+          <p:cNvPr id="23" name="Straight Connector 22">
+            <a:extLst>
+              <a:ext uri="{FF2B5EF4-FFF2-40B4-BE49-F238E27FC236}">
+                <a16:creationId xmlns:a16="http://schemas.microsoft.com/office/drawing/2014/main" id="{CD99088A-B9D0-5F5C-BF21-6A5F9306DAD1}"/>
+              </a:ext>
+            </a:extLst>
+          </p:cNvPr>
+          <p:cNvCxnSpPr>
+            <a:cxnSpLocks/>
+            <a:stCxn id="9" idx="0"/>
+          </p:cNvCxnSpPr>
+          <p:nvPr/>
+        </p:nvCxnSpPr>
+        <p:spPr>
+          <a:xfrm flipV="1">
+            <a:off x="8830418" y="2171895"/>
+            <a:ext cx="36644" cy="355470"/>
+          </a:xfrm>
+          <a:prstGeom prst="line">
+            <a:avLst/>
+          </a:prstGeom>
+          <a:ln>
+            <a:headEnd type="none" w="med" len="med"/>
+            <a:tailEnd type="arrow" w="med" len="med"/>
+          </a:ln>
+        </p:spPr>
+        <p:style>
+          <a:lnRef idx="1">
+            <a:schemeClr val="dk1"/>
+          </a:lnRef>
+          <a:fillRef idx="0">
+            <a:schemeClr val="dk1"/>
+          </a:fillRef>
+          <a:effectRef idx="0">
+            <a:schemeClr val="dk1"/>
+          </a:effectRef>
+          <a:fontRef idx="minor">
+            <a:schemeClr val="tx1"/>
+          </a:fontRef>
+        </p:style>
+      </p:cxnSp>
+      <p:cxnSp>
+        <p:nvCxnSpPr>
+          <p:cNvPr id="26" name="Straight Connector 25">
+            <a:extLst>
+              <a:ext uri="{FF2B5EF4-FFF2-40B4-BE49-F238E27FC236}">
+                <a16:creationId xmlns:a16="http://schemas.microsoft.com/office/drawing/2014/main" id="{CF821118-BEF7-7507-D94D-D9B3C63AF3BC}"/>
+              </a:ext>
+            </a:extLst>
+          </p:cNvPr>
+          <p:cNvCxnSpPr>
+            <a:cxnSpLocks/>
+            <a:stCxn id="20" idx="0"/>
+          </p:cNvCxnSpPr>
+          <p:nvPr/>
+        </p:nvCxnSpPr>
+        <p:spPr>
+          <a:xfrm flipH="1" flipV="1">
+            <a:off x="9107052" y="2171895"/>
+            <a:ext cx="81983" cy="355470"/>
+          </a:xfrm>
+          <a:prstGeom prst="line">
+            <a:avLst/>
+          </a:prstGeom>
+          <a:ln>
+            <a:headEnd type="none" w="med" len="med"/>
+            <a:tailEnd type="arrow" w="med" len="med"/>
+          </a:ln>
+        </p:spPr>
+        <p:style>
+          <a:lnRef idx="1">
+            <a:schemeClr val="dk1"/>
+          </a:lnRef>
+          <a:fillRef idx="0">
+            <a:schemeClr val="dk1"/>
+          </a:fillRef>
+          <a:effectRef idx="0">
+            <a:schemeClr val="dk1"/>
+          </a:effectRef>
+          <a:fontRef idx="minor">
+            <a:schemeClr val="tx1"/>
+          </a:fontRef>
+        </p:style>
+      </p:cxnSp>
+      <p:cxnSp>
+        <p:nvCxnSpPr>
+          <p:cNvPr id="29" name="Straight Connector 28">
+            <a:extLst>
+              <a:ext uri="{FF2B5EF4-FFF2-40B4-BE49-F238E27FC236}">
+                <a16:creationId xmlns:a16="http://schemas.microsoft.com/office/drawing/2014/main" id="{35BE14D1-5BAF-3635-54FF-76FD67DDA0EF}"/>
+              </a:ext>
+            </a:extLst>
+          </p:cNvPr>
+          <p:cNvCxnSpPr>
+            <a:cxnSpLocks/>
+            <a:stCxn id="17" idx="2"/>
+          </p:cNvCxnSpPr>
+          <p:nvPr/>
+        </p:nvCxnSpPr>
+        <p:spPr>
+          <a:xfrm flipH="1">
+            <a:off x="9100588" y="3836914"/>
+            <a:ext cx="75597" cy="466858"/>
+          </a:xfrm>
+          <a:prstGeom prst="line">
+            <a:avLst/>
+          </a:prstGeom>
+          <a:ln>
+            <a:headEnd type="none" w="med" len="med"/>
+            <a:tailEnd type="arrow" w="med" len="med"/>
+          </a:ln>
+        </p:spPr>
+        <p:style>
+          <a:lnRef idx="1">
+            <a:schemeClr val="dk1"/>
+          </a:lnRef>
+          <a:fillRef idx="0">
+            <a:schemeClr val="dk1"/>
+          </a:fillRef>
+          <a:effectRef idx="0">
+            <a:schemeClr val="dk1"/>
+          </a:effectRef>
+          <a:fontRef idx="minor">
+            <a:schemeClr val="tx1"/>
+          </a:fontRef>
+        </p:style>
+      </p:cxnSp>
+      <p:cxnSp>
+        <p:nvCxnSpPr>
+          <p:cNvPr id="32" name="Straight Connector 31">
+            <a:extLst>
+              <a:ext uri="{FF2B5EF4-FFF2-40B4-BE49-F238E27FC236}">
+                <a16:creationId xmlns:a16="http://schemas.microsoft.com/office/drawing/2014/main" id="{1027141E-86E2-5523-83D6-2D734CEED871}"/>
+              </a:ext>
+            </a:extLst>
+          </p:cNvPr>
+          <p:cNvCxnSpPr>
+            <a:cxnSpLocks/>
+            <a:stCxn id="12" idx="2"/>
+          </p:cNvCxnSpPr>
+          <p:nvPr/>
+        </p:nvCxnSpPr>
+        <p:spPr>
+          <a:xfrm>
+            <a:off x="8830418" y="3836914"/>
+            <a:ext cx="75597" cy="466858"/>
+          </a:xfrm>
+          <a:prstGeom prst="line">
+            <a:avLst/>
+          </a:prstGeom>
+          <a:ln>
+            <a:headEnd type="none" w="med" len="med"/>
+            <a:tailEnd type="arrow" w="med" len="med"/>
+          </a:ln>
+        </p:spPr>
+        <p:style>
+          <a:lnRef idx="1">
+            <a:schemeClr val="dk1"/>
+          </a:lnRef>
+          <a:fillRef idx="0">
+            <a:schemeClr val="dk1"/>
+          </a:fillRef>
+          <a:effectRef idx="0">
+            <a:schemeClr val="dk1"/>
+          </a:effectRef>
+          <a:fontRef idx="minor">
+            <a:schemeClr val="tx1"/>
+          </a:fontRef>
+        </p:style>
+      </p:cxnSp>
+      <p:sp>
+        <p:nvSpPr>
+          <p:cNvPr id="35" name="TextBox 34">
+            <a:extLst>
+              <a:ext uri="{FF2B5EF4-FFF2-40B4-BE49-F238E27FC236}">
+                <a16:creationId xmlns:a16="http://schemas.microsoft.com/office/drawing/2014/main" id="{5AE65B78-E484-916C-C3E8-23BE9554E2EB}"/>
+              </a:ext>
+            </a:extLst>
+          </p:cNvPr>
+          <p:cNvSpPr txBox="1"/>
+          <p:nvPr/>
+        </p:nvSpPr>
+        <p:spPr>
+          <a:xfrm>
+            <a:off x="10406325" y="4593348"/>
+            <a:ext cx="1492050" cy="307777"/>
+          </a:xfrm>
+          <a:prstGeom prst="rect">
+            <a:avLst/>
+          </a:prstGeom>
+          <a:noFill/>
+        </p:spPr>
+        <p:txBody>
+          <a:bodyPr wrap="square" rtlCol="0">
+            <a:spAutoFit/>
+          </a:bodyPr>
+          <a:lstStyle/>
+          <a:p>
+            <a:r>
+              <a:rPr lang="en-GB" sz="1400" dirty="0"/>
+              <a:t>Big breadboard +</a:t>
+            </a:r>
+          </a:p>
+        </p:txBody>
+      </p:sp>
+      <p:sp>
+        <p:nvSpPr>
+          <p:cNvPr id="36" name="TextBox 35">
+            <a:extLst>
+              <a:ext uri="{FF2B5EF4-FFF2-40B4-BE49-F238E27FC236}">
+                <a16:creationId xmlns:a16="http://schemas.microsoft.com/office/drawing/2014/main" id="{2CD50AA8-2E5F-67B8-1607-BFC7B08ED0C7}"/>
+              </a:ext>
+            </a:extLst>
+          </p:cNvPr>
+          <p:cNvSpPr txBox="1"/>
+          <p:nvPr/>
+        </p:nvSpPr>
+        <p:spPr>
+          <a:xfrm>
+            <a:off x="6233725" y="1728773"/>
+            <a:ext cx="1492050" cy="307777"/>
+          </a:xfrm>
+          <a:prstGeom prst="rect">
+            <a:avLst/>
+          </a:prstGeom>
+          <a:noFill/>
+        </p:spPr>
+        <p:txBody>
+          <a:bodyPr wrap="square" rtlCol="0">
+            <a:spAutoFit/>
+          </a:bodyPr>
+          <a:lstStyle/>
+          <a:p>
+            <a:r>
+              <a:rPr lang="en-GB" sz="1400" dirty="0"/>
+              <a:t>Big breadboard +</a:t>
+            </a:r>
+          </a:p>
+        </p:txBody>
+      </p:sp>
+      <p:cxnSp>
+        <p:nvCxnSpPr>
+          <p:cNvPr id="37" name="Straight Connector 36">
+            <a:extLst>
+              <a:ext uri="{FF2B5EF4-FFF2-40B4-BE49-F238E27FC236}">
+                <a16:creationId xmlns:a16="http://schemas.microsoft.com/office/drawing/2014/main" id="{85045027-E7DE-557E-1921-0EBE8C60D269}"/>
+              </a:ext>
+            </a:extLst>
+          </p:cNvPr>
+          <p:cNvCxnSpPr>
+            <a:cxnSpLocks/>
+            <a:stCxn id="7" idx="2"/>
+          </p:cNvCxnSpPr>
+          <p:nvPr/>
+        </p:nvCxnSpPr>
+        <p:spPr>
+          <a:xfrm>
+            <a:off x="10119632" y="3836914"/>
+            <a:ext cx="441688" cy="756434"/>
+          </a:xfrm>
+          <a:prstGeom prst="line">
+            <a:avLst/>
+          </a:prstGeom>
+          <a:ln>
+            <a:solidFill>
+              <a:srgbClr val="FF0000"/>
+            </a:solidFill>
+            <a:headEnd type="none" w="med" len="med"/>
+            <a:tailEnd type="arrow" w="med" len="med"/>
+          </a:ln>
+        </p:spPr>
+        <p:style>
+          <a:lnRef idx="2">
+            <a:schemeClr val="accent1"/>
+          </a:lnRef>
+          <a:fillRef idx="0">
+            <a:schemeClr val="accent1"/>
+          </a:fillRef>
+          <a:effectRef idx="1">
+            <a:schemeClr val="accent1"/>
+          </a:effectRef>
+          <a:fontRef idx="minor">
+            <a:schemeClr val="tx1"/>
+          </a:fontRef>
+        </p:style>
+      </p:cxnSp>
+      <p:cxnSp>
+        <p:nvCxnSpPr>
+          <p:cNvPr id="40" name="Straight Connector 39">
+            <a:extLst>
+              <a:ext uri="{FF2B5EF4-FFF2-40B4-BE49-F238E27FC236}">
+                <a16:creationId xmlns:a16="http://schemas.microsoft.com/office/drawing/2014/main" id="{AC7AB790-F95F-5B99-EEB8-E589D5947CC0}"/>
+              </a:ext>
+            </a:extLst>
+          </p:cNvPr>
+          <p:cNvCxnSpPr>
+            <a:cxnSpLocks/>
+            <a:stCxn id="8" idx="0"/>
+          </p:cNvCxnSpPr>
+          <p:nvPr/>
+        </p:nvCxnSpPr>
+        <p:spPr>
+          <a:xfrm flipH="1" flipV="1">
+            <a:off x="7537232" y="2036550"/>
+            <a:ext cx="362589" cy="490815"/>
+          </a:xfrm>
+          <a:prstGeom prst="line">
+            <a:avLst/>
+          </a:prstGeom>
+          <a:ln>
+            <a:solidFill>
+              <a:srgbClr val="FF0000"/>
+            </a:solidFill>
+            <a:headEnd type="none" w="med" len="med"/>
+            <a:tailEnd type="arrow" w="med" len="med"/>
+          </a:ln>
+        </p:spPr>
+        <p:style>
+          <a:lnRef idx="2">
+            <a:schemeClr val="accent1"/>
+          </a:lnRef>
+          <a:fillRef idx="0">
+            <a:schemeClr val="accent1"/>
+          </a:fillRef>
+          <a:effectRef idx="1">
+            <a:schemeClr val="accent1"/>
+          </a:effectRef>
+          <a:fontRef idx="minor">
+            <a:schemeClr val="tx1"/>
+          </a:fontRef>
+        </p:style>
+      </p:cxnSp>
+      <p:sp>
+        <p:nvSpPr>
+          <p:cNvPr id="43" name="TextBox 42">
+            <a:extLst>
+              <a:ext uri="{FF2B5EF4-FFF2-40B4-BE49-F238E27FC236}">
+                <a16:creationId xmlns:a16="http://schemas.microsoft.com/office/drawing/2014/main" id="{61A67B76-5FC2-2CDE-3EF4-43867E4DC22A}"/>
+              </a:ext>
+            </a:extLst>
+          </p:cNvPr>
+          <p:cNvSpPr txBox="1"/>
+          <p:nvPr/>
+        </p:nvSpPr>
+        <p:spPr>
+          <a:xfrm>
+            <a:off x="10089212" y="1574884"/>
+            <a:ext cx="1354207" cy="307777"/>
+          </a:xfrm>
+          <a:prstGeom prst="rect">
+            <a:avLst/>
+          </a:prstGeom>
+          <a:noFill/>
+          <a:ln>
+            <a:noFill/>
+          </a:ln>
+        </p:spPr>
+        <p:style>
+          <a:lnRef idx="0">
+            <a:scrgbClr r="0" g="0" b="0"/>
+          </a:lnRef>
+          <a:fillRef idx="0">
+            <a:scrgbClr r="0" g="0" b="0"/>
+          </a:fillRef>
+          <a:effectRef idx="0">
+            <a:scrgbClr r="0" g="0" b="0"/>
+          </a:effectRef>
+          <a:fontRef idx="minor">
+            <a:schemeClr val="dk1"/>
+          </a:fontRef>
+        </p:style>
+        <p:txBody>
+          <a:bodyPr wrap="square" rtlCol="0">
+            <a:spAutoFit/>
+          </a:bodyPr>
+          <a:lstStyle/>
+          <a:p>
+            <a:pPr algn="ctr"/>
+            <a:r>
+              <a:rPr lang="en-GB" sz="1400" dirty="0"/>
+              <a:t>Motor R signal</a:t>
+            </a:r>
+          </a:p>
+        </p:txBody>
+      </p:sp>
+      <p:cxnSp>
+        <p:nvCxnSpPr>
+          <p:cNvPr id="44" name="Straight Connector 43">
+            <a:extLst>
+              <a:ext uri="{FF2B5EF4-FFF2-40B4-BE49-F238E27FC236}">
+                <a16:creationId xmlns:a16="http://schemas.microsoft.com/office/drawing/2014/main" id="{4E43EB4A-BEF4-E7FF-A3F0-A8B74230FB22}"/>
+              </a:ext>
+            </a:extLst>
+          </p:cNvPr>
+          <p:cNvCxnSpPr>
+            <a:cxnSpLocks/>
+            <a:stCxn id="6" idx="0"/>
+          </p:cNvCxnSpPr>
+          <p:nvPr/>
+        </p:nvCxnSpPr>
+        <p:spPr>
+          <a:xfrm flipV="1">
+            <a:off x="10119632" y="1882661"/>
+            <a:ext cx="368536" cy="644704"/>
+          </a:xfrm>
+          <a:prstGeom prst="line">
+            <a:avLst/>
+          </a:prstGeom>
+          <a:ln>
+            <a:headEnd type="none" w="med" len="med"/>
+            <a:tailEnd type="arrow" w="med" len="med"/>
+          </a:ln>
+        </p:spPr>
+        <p:style>
+          <a:lnRef idx="1">
+            <a:schemeClr val="accent2"/>
+          </a:lnRef>
+          <a:fillRef idx="0">
+            <a:schemeClr val="accent2"/>
+          </a:fillRef>
+          <a:effectRef idx="0">
+            <a:schemeClr val="accent2"/>
+          </a:effectRef>
+          <a:fontRef idx="minor">
+            <a:schemeClr val="tx1"/>
+          </a:fontRef>
+        </p:style>
+      </p:cxnSp>
+      <p:sp>
+        <p:nvSpPr>
+          <p:cNvPr id="47" name="TextBox 46">
+            <a:extLst>
+              <a:ext uri="{FF2B5EF4-FFF2-40B4-BE49-F238E27FC236}">
+                <a16:creationId xmlns:a16="http://schemas.microsoft.com/office/drawing/2014/main" id="{B4D188D1-99A3-8B7B-F4A8-55D3F6B96FB3}"/>
+              </a:ext>
+            </a:extLst>
+          </p:cNvPr>
+          <p:cNvSpPr txBox="1"/>
+          <p:nvPr/>
+        </p:nvSpPr>
+        <p:spPr>
+          <a:xfrm>
+            <a:off x="6434064" y="4335710"/>
+            <a:ext cx="1354207" cy="307777"/>
+          </a:xfrm>
+          <a:prstGeom prst="rect">
+            <a:avLst/>
+          </a:prstGeom>
+          <a:noFill/>
+          <a:ln>
+            <a:noFill/>
+          </a:ln>
+        </p:spPr>
+        <p:style>
+          <a:lnRef idx="0">
+            <a:scrgbClr r="0" g="0" b="0"/>
+          </a:lnRef>
+          <a:fillRef idx="0">
+            <a:scrgbClr r="0" g="0" b="0"/>
+          </a:fillRef>
+          <a:effectRef idx="0">
+            <a:scrgbClr r="0" g="0" b="0"/>
+          </a:effectRef>
+          <a:fontRef idx="minor">
+            <a:schemeClr val="dk1"/>
+          </a:fontRef>
+        </p:style>
+        <p:txBody>
+          <a:bodyPr wrap="square" rtlCol="0">
+            <a:spAutoFit/>
+          </a:bodyPr>
+          <a:lstStyle/>
+          <a:p>
+            <a:pPr algn="ctr"/>
+            <a:r>
+              <a:rPr lang="en-GB" sz="1400" dirty="0"/>
+              <a:t>Motor L signal</a:t>
+            </a:r>
+          </a:p>
+        </p:txBody>
+      </p:sp>
+      <p:cxnSp>
+        <p:nvCxnSpPr>
+          <p:cNvPr id="48" name="Straight Connector 47">
+            <a:extLst>
+              <a:ext uri="{FF2B5EF4-FFF2-40B4-BE49-F238E27FC236}">
+                <a16:creationId xmlns:a16="http://schemas.microsoft.com/office/drawing/2014/main" id="{4A6D1F14-5778-50A5-F689-E4143AABC9DB}"/>
+              </a:ext>
+            </a:extLst>
+          </p:cNvPr>
+          <p:cNvCxnSpPr>
+            <a:cxnSpLocks/>
+            <a:stCxn id="5" idx="2"/>
+          </p:cNvCxnSpPr>
+          <p:nvPr/>
+        </p:nvCxnSpPr>
+        <p:spPr>
+          <a:xfrm flipH="1">
+            <a:off x="7463345" y="3836914"/>
+            <a:ext cx="431247" cy="466858"/>
+          </a:xfrm>
+          <a:prstGeom prst="line">
+            <a:avLst/>
+          </a:prstGeom>
+          <a:ln>
+            <a:headEnd type="none" w="med" len="med"/>
+            <a:tailEnd type="arrow" w="med" len="med"/>
+          </a:ln>
+        </p:spPr>
+        <p:style>
+          <a:lnRef idx="1">
+            <a:schemeClr val="accent2"/>
+          </a:lnRef>
+          <a:fillRef idx="0">
+            <a:schemeClr val="accent2"/>
+          </a:fillRef>
+          <a:effectRef idx="0">
+            <a:schemeClr val="accent2"/>
+          </a:effectRef>
+          <a:fontRef idx="minor">
+            <a:schemeClr val="tx1"/>
+          </a:fontRef>
+        </p:style>
+      </p:cxnSp>
+      <p:sp>
+        <p:nvSpPr>
+          <p:cNvPr id="57" name="TextBox 56">
+            <a:extLst>
+              <a:ext uri="{FF2B5EF4-FFF2-40B4-BE49-F238E27FC236}">
+                <a16:creationId xmlns:a16="http://schemas.microsoft.com/office/drawing/2014/main" id="{9FA342FF-60B0-C433-5EA9-C7A36F5F42EE}"/>
+              </a:ext>
+            </a:extLst>
+          </p:cNvPr>
+          <p:cNvSpPr txBox="1"/>
+          <p:nvPr/>
+        </p:nvSpPr>
+        <p:spPr>
+          <a:xfrm>
+            <a:off x="8510298" y="5864834"/>
+            <a:ext cx="996364" cy="340519"/>
+          </a:xfrm>
+          <a:prstGeom prst="roundRect">
+            <a:avLst/>
+          </a:prstGeom>
+          <a:noFill/>
+          <a:ln w="28575">
+            <a:solidFill>
+              <a:schemeClr val="tx1"/>
+            </a:solidFill>
+          </a:ln>
+        </p:spPr>
+        <p:style>
+          <a:lnRef idx="0">
+            <a:scrgbClr r="0" g="0" b="0"/>
+          </a:lnRef>
+          <a:fillRef idx="0">
+            <a:scrgbClr r="0" g="0" b="0"/>
+          </a:fillRef>
+          <a:effectRef idx="0">
+            <a:scrgbClr r="0" g="0" b="0"/>
+          </a:effectRef>
+          <a:fontRef idx="minor">
+            <a:schemeClr val="dk1"/>
+          </a:fontRef>
+        </p:style>
+        <p:txBody>
+          <a:bodyPr wrap="square" rtlCol="0">
+            <a:spAutoFit/>
+          </a:bodyPr>
+          <a:lstStyle/>
+          <a:p>
+            <a:pPr algn="ctr"/>
+            <a:r>
+              <a:rPr lang="en-GB" sz="1400" dirty="0"/>
+              <a:t>Motor L</a:t>
+            </a:r>
+          </a:p>
+        </p:txBody>
+      </p:sp>
+      <p:sp>
+        <p:nvSpPr>
+          <p:cNvPr id="59" name="TextBox 58">
+            <a:extLst>
+              <a:ext uri="{FF2B5EF4-FFF2-40B4-BE49-F238E27FC236}">
+                <a16:creationId xmlns:a16="http://schemas.microsoft.com/office/drawing/2014/main" id="{611BBAC7-2C9D-7F29-3F4E-DF2B4D447820}"/>
+              </a:ext>
+            </a:extLst>
+          </p:cNvPr>
+          <p:cNvSpPr txBox="1"/>
+          <p:nvPr/>
+        </p:nvSpPr>
+        <p:spPr>
+          <a:xfrm>
+            <a:off x="8477493" y="411134"/>
+            <a:ext cx="996364" cy="340519"/>
+          </a:xfrm>
+          <a:prstGeom prst="roundRect">
+            <a:avLst/>
+          </a:prstGeom>
+          <a:noFill/>
+          <a:ln w="28575">
+            <a:solidFill>
+              <a:schemeClr val="tx1"/>
+            </a:solidFill>
+          </a:ln>
+        </p:spPr>
+        <p:style>
+          <a:lnRef idx="0">
+            <a:scrgbClr r="0" g="0" b="0"/>
+          </a:lnRef>
+          <a:fillRef idx="0">
+            <a:scrgbClr r="0" g="0" b="0"/>
+          </a:fillRef>
+          <a:effectRef idx="0">
+            <a:scrgbClr r="0" g="0" b="0"/>
+          </a:effectRef>
+          <a:fontRef idx="minor">
+            <a:schemeClr val="dk1"/>
+          </a:fontRef>
+        </p:style>
+        <p:txBody>
+          <a:bodyPr wrap="square" rtlCol="0">
+            <a:spAutoFit/>
+          </a:bodyPr>
+          <a:lstStyle/>
+          <a:p>
+            <a:pPr algn="ctr"/>
+            <a:r>
+              <a:rPr lang="en-GB" sz="1400" dirty="0"/>
+              <a:t>Motor R</a:t>
+            </a:r>
+          </a:p>
+        </p:txBody>
+      </p:sp>
+      <p:sp>
+        <p:nvSpPr>
+          <p:cNvPr id="60" name="TextBox 59">
+            <a:extLst>
+              <a:ext uri="{FF2B5EF4-FFF2-40B4-BE49-F238E27FC236}">
+                <a16:creationId xmlns:a16="http://schemas.microsoft.com/office/drawing/2014/main" id="{6005267B-2B2D-7473-7217-E5903CF6A6E0}"/>
+              </a:ext>
+            </a:extLst>
+          </p:cNvPr>
+          <p:cNvSpPr txBox="1"/>
+          <p:nvPr/>
+        </p:nvSpPr>
+        <p:spPr>
+          <a:xfrm>
+            <a:off x="9439942" y="5864834"/>
+            <a:ext cx="334979" cy="276999"/>
+          </a:xfrm>
+          <a:prstGeom prst="rect">
+            <a:avLst/>
+          </a:prstGeom>
+          <a:noFill/>
+        </p:spPr>
+        <p:txBody>
+          <a:bodyPr wrap="square" rtlCol="0">
+            <a:spAutoFit/>
+          </a:bodyPr>
+          <a:lstStyle/>
+          <a:p>
+            <a:pPr algn="ctr"/>
+            <a:r>
+              <a:rPr lang="en-GB" sz="1200" b="1" dirty="0"/>
+              <a:t>+</a:t>
+            </a:r>
+          </a:p>
+        </p:txBody>
+      </p:sp>
+      <p:sp>
+        <p:nvSpPr>
+          <p:cNvPr id="61" name="TextBox 60">
+            <a:extLst>
+              <a:ext uri="{FF2B5EF4-FFF2-40B4-BE49-F238E27FC236}">
+                <a16:creationId xmlns:a16="http://schemas.microsoft.com/office/drawing/2014/main" id="{DC8CFA2A-399D-9355-4FD2-A785B5300530}"/>
+              </a:ext>
+            </a:extLst>
+          </p:cNvPr>
+          <p:cNvSpPr txBox="1"/>
+          <p:nvPr/>
+        </p:nvSpPr>
+        <p:spPr>
+          <a:xfrm>
+            <a:off x="8204084" y="348133"/>
+            <a:ext cx="334979" cy="276999"/>
+          </a:xfrm>
+          <a:prstGeom prst="rect">
+            <a:avLst/>
+          </a:prstGeom>
+          <a:noFill/>
+        </p:spPr>
+        <p:txBody>
+          <a:bodyPr wrap="square" rtlCol="0">
+            <a:spAutoFit/>
+          </a:bodyPr>
+          <a:lstStyle/>
+          <a:p>
+            <a:pPr algn="ctr"/>
+            <a:r>
+              <a:rPr lang="en-GB" sz="1200" b="1" dirty="0"/>
+              <a:t>-</a:t>
+            </a:r>
+          </a:p>
+        </p:txBody>
+      </p:sp>
+      <p:sp>
+        <p:nvSpPr>
+          <p:cNvPr id="62" name="TextBox 61">
+            <a:extLst>
+              <a:ext uri="{FF2B5EF4-FFF2-40B4-BE49-F238E27FC236}">
+                <a16:creationId xmlns:a16="http://schemas.microsoft.com/office/drawing/2014/main" id="{67C67FAA-F9F9-E0A3-2529-0254A8AA1770}"/>
+              </a:ext>
+            </a:extLst>
+          </p:cNvPr>
+          <p:cNvSpPr txBox="1"/>
+          <p:nvPr/>
+        </p:nvSpPr>
+        <p:spPr>
+          <a:xfrm>
+            <a:off x="8231681" y="5839766"/>
+            <a:ext cx="334979" cy="276999"/>
+          </a:xfrm>
+          <a:prstGeom prst="rect">
+            <a:avLst/>
+          </a:prstGeom>
+          <a:noFill/>
+        </p:spPr>
+        <p:txBody>
+          <a:bodyPr wrap="square" rtlCol="0">
+            <a:spAutoFit/>
+          </a:bodyPr>
+          <a:lstStyle/>
+          <a:p>
+            <a:pPr algn="ctr"/>
+            <a:r>
+              <a:rPr lang="en-GB" sz="1200" b="1" dirty="0"/>
+              <a:t>-</a:t>
+            </a:r>
+          </a:p>
+        </p:txBody>
+      </p:sp>
+      <p:sp>
+        <p:nvSpPr>
+          <p:cNvPr id="63" name="TextBox 62">
+            <a:extLst>
+              <a:ext uri="{FF2B5EF4-FFF2-40B4-BE49-F238E27FC236}">
+                <a16:creationId xmlns:a16="http://schemas.microsoft.com/office/drawing/2014/main" id="{0ECC5BA9-E96C-983A-1081-1063E011EB2B}"/>
+              </a:ext>
+            </a:extLst>
+          </p:cNvPr>
+          <p:cNvSpPr txBox="1"/>
+          <p:nvPr/>
+        </p:nvSpPr>
+        <p:spPr>
+          <a:xfrm>
+            <a:off x="9439941" y="316580"/>
+            <a:ext cx="334979" cy="276999"/>
+          </a:xfrm>
+          <a:prstGeom prst="rect">
+            <a:avLst/>
+          </a:prstGeom>
+          <a:noFill/>
+        </p:spPr>
+        <p:txBody>
+          <a:bodyPr wrap="square" rtlCol="0">
+            <a:spAutoFit/>
+          </a:bodyPr>
+          <a:lstStyle/>
+          <a:p>
+            <a:pPr algn="ctr"/>
+            <a:r>
+              <a:rPr lang="en-GB" sz="1200" b="1" dirty="0"/>
+              <a:t>+</a:t>
+            </a:r>
+          </a:p>
+        </p:txBody>
+      </p:sp>
+      <p:cxnSp>
+        <p:nvCxnSpPr>
+          <p:cNvPr id="64" name="Straight Connector 63">
+            <a:extLst>
+              <a:ext uri="{FF2B5EF4-FFF2-40B4-BE49-F238E27FC236}">
+                <a16:creationId xmlns:a16="http://schemas.microsoft.com/office/drawing/2014/main" id="{51019FB3-B8A5-5E41-D551-104F9B7D10AC}"/>
+              </a:ext>
+            </a:extLst>
+          </p:cNvPr>
+          <p:cNvCxnSpPr>
+            <a:cxnSpLocks/>
+            <a:stCxn id="16" idx="2"/>
+          </p:cNvCxnSpPr>
+          <p:nvPr/>
+        </p:nvCxnSpPr>
+        <p:spPr>
+          <a:xfrm flipH="1">
+            <a:off x="9473857" y="3836914"/>
+            <a:ext cx="19955" cy="2002852"/>
+          </a:xfrm>
+          <a:prstGeom prst="line">
+            <a:avLst/>
+          </a:prstGeom>
+          <a:ln>
+            <a:solidFill>
+              <a:srgbClr val="FF0000"/>
+            </a:solidFill>
+            <a:headEnd type="none" w="med" len="med"/>
+            <a:tailEnd type="none" w="med" len="med"/>
+          </a:ln>
+        </p:spPr>
+        <p:style>
+          <a:lnRef idx="2">
+            <a:schemeClr val="accent1"/>
+          </a:lnRef>
+          <a:fillRef idx="0">
+            <a:schemeClr val="accent1"/>
+          </a:fillRef>
+          <a:effectRef idx="1">
+            <a:schemeClr val="accent1"/>
+          </a:effectRef>
+          <a:fontRef idx="minor">
+            <a:schemeClr val="tx1"/>
+          </a:fontRef>
+        </p:style>
+      </p:cxnSp>
+      <p:cxnSp>
+        <p:nvCxnSpPr>
+          <p:cNvPr id="68" name="Straight Connector 67">
+            <a:extLst>
+              <a:ext uri="{FF2B5EF4-FFF2-40B4-BE49-F238E27FC236}">
+                <a16:creationId xmlns:a16="http://schemas.microsoft.com/office/drawing/2014/main" id="{E3D2DA5A-AC95-4D72-043F-77BDB8ED62CE}"/>
+              </a:ext>
+            </a:extLst>
+          </p:cNvPr>
+          <p:cNvCxnSpPr>
+            <a:cxnSpLocks/>
+            <a:endCxn id="19" idx="0"/>
+          </p:cNvCxnSpPr>
+          <p:nvPr/>
+        </p:nvCxnSpPr>
+        <p:spPr>
+          <a:xfrm>
+            <a:off x="9438559" y="751232"/>
+            <a:ext cx="68103" cy="1776133"/>
+          </a:xfrm>
+          <a:prstGeom prst="line">
+            <a:avLst/>
+          </a:prstGeom>
+          <a:ln>
+            <a:solidFill>
+              <a:srgbClr val="FF0000"/>
+            </a:solidFill>
+            <a:headEnd type="none" w="med" len="med"/>
+            <a:tailEnd type="none" w="med" len="med"/>
+          </a:ln>
+        </p:spPr>
+        <p:style>
+          <a:lnRef idx="2">
+            <a:schemeClr val="accent1"/>
+          </a:lnRef>
+          <a:fillRef idx="0">
+            <a:schemeClr val="accent1"/>
+          </a:fillRef>
+          <a:effectRef idx="1">
+            <a:schemeClr val="accent1"/>
+          </a:effectRef>
+          <a:fontRef idx="minor">
+            <a:schemeClr val="tx1"/>
+          </a:fontRef>
+        </p:style>
+      </p:cxnSp>
+      <p:cxnSp>
+        <p:nvCxnSpPr>
+          <p:cNvPr id="71" name="Straight Connector 70">
+            <a:extLst>
+              <a:ext uri="{FF2B5EF4-FFF2-40B4-BE49-F238E27FC236}">
+                <a16:creationId xmlns:a16="http://schemas.microsoft.com/office/drawing/2014/main" id="{4401450B-BEB8-42CD-E8AC-9A2622FFC2CB}"/>
+              </a:ext>
+            </a:extLst>
+          </p:cNvPr>
+          <p:cNvCxnSpPr>
+            <a:cxnSpLocks/>
+            <a:endCxn id="10" idx="0"/>
+          </p:cNvCxnSpPr>
+          <p:nvPr/>
+        </p:nvCxnSpPr>
+        <p:spPr>
+          <a:xfrm flipH="1">
+            <a:off x="8503438" y="751232"/>
+            <a:ext cx="6860" cy="1776133"/>
+          </a:xfrm>
+          <a:prstGeom prst="line">
+            <a:avLst/>
+          </a:prstGeom>
+          <a:ln w="19050">
+            <a:headEnd type="none" w="med" len="med"/>
+            <a:tailEnd type="none" w="med" len="med"/>
+          </a:ln>
+        </p:spPr>
+        <p:style>
+          <a:lnRef idx="1">
+            <a:schemeClr val="dk1"/>
+          </a:lnRef>
+          <a:fillRef idx="0">
+            <a:schemeClr val="dk1"/>
+          </a:fillRef>
+          <a:effectRef idx="0">
+            <a:schemeClr val="dk1"/>
+          </a:effectRef>
+          <a:fontRef idx="minor">
+            <a:schemeClr val="tx1"/>
+          </a:fontRef>
+        </p:style>
+      </p:cxnSp>
+      <p:cxnSp>
+        <p:nvCxnSpPr>
+          <p:cNvPr id="75" name="Straight Connector 74">
+            <a:extLst>
+              <a:ext uri="{FF2B5EF4-FFF2-40B4-BE49-F238E27FC236}">
+                <a16:creationId xmlns:a16="http://schemas.microsoft.com/office/drawing/2014/main" id="{EAC5A8EC-42AE-0FEB-B035-BD96E90E7668}"/>
+              </a:ext>
+            </a:extLst>
+          </p:cNvPr>
+          <p:cNvCxnSpPr>
+            <a:cxnSpLocks/>
+            <a:stCxn id="13" idx="2"/>
+          </p:cNvCxnSpPr>
+          <p:nvPr/>
+        </p:nvCxnSpPr>
+        <p:spPr>
+          <a:xfrm>
+            <a:off x="8503438" y="3836914"/>
+            <a:ext cx="63222" cy="2027920"/>
+          </a:xfrm>
+          <a:prstGeom prst="line">
+            <a:avLst/>
+          </a:prstGeom>
+          <a:ln w="19050">
+            <a:headEnd type="none" w="med" len="med"/>
+            <a:tailEnd type="none" w="med" len="med"/>
+          </a:ln>
+        </p:spPr>
+        <p:style>
+          <a:lnRef idx="1">
+            <a:schemeClr val="dk1"/>
+          </a:lnRef>
+          <a:fillRef idx="0">
+            <a:schemeClr val="dk1"/>
+          </a:fillRef>
+          <a:effectRef idx="0">
+            <a:schemeClr val="dk1"/>
+          </a:effectRef>
+          <a:fontRef idx="minor">
+            <a:schemeClr val="tx1"/>
+          </a:fontRef>
+        </p:style>
+      </p:cxnSp>
+      <p:sp>
+        <p:nvSpPr>
+          <p:cNvPr id="78" name="TextBox 77">
+            <a:extLst>
+              <a:ext uri="{FF2B5EF4-FFF2-40B4-BE49-F238E27FC236}">
+                <a16:creationId xmlns:a16="http://schemas.microsoft.com/office/drawing/2014/main" id="{9150C134-9155-C5D8-C275-56413773A003}"/>
+              </a:ext>
+            </a:extLst>
+          </p:cNvPr>
+          <p:cNvSpPr txBox="1"/>
+          <p:nvPr/>
+        </p:nvSpPr>
+        <p:spPr>
+          <a:xfrm>
+            <a:off x="6861250" y="5088135"/>
+            <a:ext cx="1492050" cy="307777"/>
+          </a:xfrm>
+          <a:prstGeom prst="rect">
+            <a:avLst/>
+          </a:prstGeom>
+          <a:noFill/>
+        </p:spPr>
+        <p:txBody>
+          <a:bodyPr wrap="square" rtlCol="0">
+            <a:spAutoFit/>
+          </a:bodyPr>
+          <a:lstStyle/>
+          <a:p>
+            <a:r>
+              <a:rPr lang="en-GB" sz="1400" dirty="0"/>
+              <a:t>Big breadboard +</a:t>
+            </a:r>
+          </a:p>
+        </p:txBody>
+      </p:sp>
+      <p:cxnSp>
+        <p:nvCxnSpPr>
+          <p:cNvPr id="79" name="Straight Connector 78">
+            <a:extLst>
+              <a:ext uri="{FF2B5EF4-FFF2-40B4-BE49-F238E27FC236}">
+                <a16:creationId xmlns:a16="http://schemas.microsoft.com/office/drawing/2014/main" id="{A345BD12-AFEF-16B9-D9C4-20EFE7C7BF08}"/>
+              </a:ext>
+            </a:extLst>
+          </p:cNvPr>
+          <p:cNvCxnSpPr>
+            <a:cxnSpLocks/>
+            <a:stCxn id="14" idx="2"/>
+          </p:cNvCxnSpPr>
+          <p:nvPr/>
+        </p:nvCxnSpPr>
+        <p:spPr>
+          <a:xfrm flipH="1">
+            <a:off x="7915641" y="3836914"/>
+            <a:ext cx="270170" cy="1251221"/>
+          </a:xfrm>
+          <a:prstGeom prst="line">
+            <a:avLst/>
+          </a:prstGeom>
+          <a:ln>
+            <a:solidFill>
+              <a:srgbClr val="FF0000"/>
+            </a:solidFill>
+            <a:headEnd type="none" w="med" len="med"/>
+            <a:tailEnd type="arrow" w="med" len="med"/>
+          </a:ln>
+        </p:spPr>
+        <p:style>
+          <a:lnRef idx="2">
+            <a:schemeClr val="accent1"/>
+          </a:lnRef>
+          <a:fillRef idx="0">
+            <a:schemeClr val="accent1"/>
+          </a:fillRef>
+          <a:effectRef idx="1">
+            <a:schemeClr val="accent1"/>
+          </a:effectRef>
+          <a:fontRef idx="minor">
+            <a:schemeClr val="tx1"/>
+          </a:fontRef>
+        </p:style>
+      </p:cxnSp>
+      <p:sp>
+        <p:nvSpPr>
+          <p:cNvPr id="82" name="TextBox 81">
+            <a:extLst>
+              <a:ext uri="{FF2B5EF4-FFF2-40B4-BE49-F238E27FC236}">
+                <a16:creationId xmlns:a16="http://schemas.microsoft.com/office/drawing/2014/main" id="{0F39EDDA-BEED-445C-6252-F41432EA03B4}"/>
+              </a:ext>
+            </a:extLst>
+          </p:cNvPr>
+          <p:cNvSpPr txBox="1"/>
+          <p:nvPr/>
+        </p:nvSpPr>
+        <p:spPr>
+          <a:xfrm>
+            <a:off x="9660300" y="850701"/>
+            <a:ext cx="1492050" cy="307777"/>
+          </a:xfrm>
+          <a:prstGeom prst="rect">
+            <a:avLst/>
+          </a:prstGeom>
+          <a:noFill/>
+        </p:spPr>
+        <p:txBody>
+          <a:bodyPr wrap="square" rtlCol="0">
+            <a:spAutoFit/>
+          </a:bodyPr>
+          <a:lstStyle/>
+          <a:p>
+            <a:r>
+              <a:rPr lang="en-GB" sz="1400" dirty="0"/>
+              <a:t>Big breadboard +</a:t>
+            </a:r>
+          </a:p>
+        </p:txBody>
+      </p:sp>
+      <p:cxnSp>
+        <p:nvCxnSpPr>
+          <p:cNvPr id="83" name="Straight Connector 82">
+            <a:extLst>
+              <a:ext uri="{FF2B5EF4-FFF2-40B4-BE49-F238E27FC236}">
+                <a16:creationId xmlns:a16="http://schemas.microsoft.com/office/drawing/2014/main" id="{AFAFAFC7-B0FD-2D2C-B388-DA4261843842}"/>
+              </a:ext>
+            </a:extLst>
+          </p:cNvPr>
+          <p:cNvCxnSpPr>
+            <a:cxnSpLocks/>
+            <a:stCxn id="18" idx="0"/>
+          </p:cNvCxnSpPr>
+          <p:nvPr/>
+        </p:nvCxnSpPr>
+        <p:spPr>
+          <a:xfrm flipV="1">
+            <a:off x="9833642" y="1158478"/>
+            <a:ext cx="167508" cy="1368887"/>
+          </a:xfrm>
+          <a:prstGeom prst="line">
+            <a:avLst/>
+          </a:prstGeom>
+          <a:ln>
+            <a:solidFill>
+              <a:srgbClr val="FF0000"/>
+            </a:solidFill>
+            <a:headEnd type="none" w="med" len="med"/>
+            <a:tailEnd type="arrow" w="med" len="med"/>
+          </a:ln>
+        </p:spPr>
+        <p:style>
+          <a:lnRef idx="2">
+            <a:schemeClr val="accent1"/>
+          </a:lnRef>
+          <a:fillRef idx="0">
+            <a:schemeClr val="accent1"/>
+          </a:fillRef>
+          <a:effectRef idx="1">
+            <a:schemeClr val="accent1"/>
+          </a:effectRef>
+          <a:fontRef idx="minor">
+            <a:schemeClr val="tx1"/>
+          </a:fontRef>
+        </p:style>
+      </p:cxnSp>
+      <p:cxnSp>
+        <p:nvCxnSpPr>
+          <p:cNvPr id="86" name="Straight Connector 85">
+            <a:extLst>
+              <a:ext uri="{FF2B5EF4-FFF2-40B4-BE49-F238E27FC236}">
+                <a16:creationId xmlns:a16="http://schemas.microsoft.com/office/drawing/2014/main" id="{7204311D-69B1-4FE2-A618-B2C13E0F778A}"/>
+              </a:ext>
+            </a:extLst>
+          </p:cNvPr>
+          <p:cNvCxnSpPr>
+            <a:cxnSpLocks/>
+            <a:stCxn id="15" idx="2"/>
+          </p:cNvCxnSpPr>
+          <p:nvPr/>
+        </p:nvCxnSpPr>
+        <p:spPr>
+          <a:xfrm flipH="1">
+            <a:off x="9181541" y="3836914"/>
+            <a:ext cx="639251" cy="620747"/>
+          </a:xfrm>
+          <a:prstGeom prst="line">
+            <a:avLst/>
+          </a:prstGeom>
+          <a:ln>
+            <a:headEnd type="none" w="med" len="med"/>
+            <a:tailEnd type="arrow" w="med" len="med"/>
+          </a:ln>
+        </p:spPr>
+        <p:style>
+          <a:lnRef idx="1">
+            <a:schemeClr val="dk1"/>
+          </a:lnRef>
+          <a:fillRef idx="0">
+            <a:schemeClr val="dk1"/>
+          </a:fillRef>
+          <a:effectRef idx="0">
+            <a:schemeClr val="dk1"/>
+          </a:effectRef>
+          <a:fontRef idx="minor">
+            <a:schemeClr val="tx1"/>
+          </a:fontRef>
+        </p:style>
+      </p:cxnSp>
+      <p:cxnSp>
+        <p:nvCxnSpPr>
+          <p:cNvPr id="89" name="Straight Connector 88">
+            <a:extLst>
+              <a:ext uri="{FF2B5EF4-FFF2-40B4-BE49-F238E27FC236}">
+                <a16:creationId xmlns:a16="http://schemas.microsoft.com/office/drawing/2014/main" id="{3017E85E-C263-689B-3040-777A704CE431}"/>
+              </a:ext>
+            </a:extLst>
+          </p:cNvPr>
+          <p:cNvCxnSpPr>
+            <a:cxnSpLocks/>
+            <a:stCxn id="11" idx="0"/>
+          </p:cNvCxnSpPr>
+          <p:nvPr/>
+        </p:nvCxnSpPr>
+        <p:spPr>
+          <a:xfrm flipV="1">
+            <a:off x="8185811" y="1919964"/>
+            <a:ext cx="682405" cy="607401"/>
+          </a:xfrm>
+          <a:prstGeom prst="line">
+            <a:avLst/>
+          </a:prstGeom>
+          <a:ln>
+            <a:headEnd type="none" w="med" len="med"/>
+            <a:tailEnd type="arrow" w="med" len="med"/>
+          </a:ln>
+        </p:spPr>
+        <p:style>
+          <a:lnRef idx="1">
+            <a:schemeClr val="dk1"/>
+          </a:lnRef>
+          <a:fillRef idx="0">
+            <a:schemeClr val="dk1"/>
+          </a:fillRef>
+          <a:effectRef idx="0">
+            <a:schemeClr val="dk1"/>
+          </a:effectRef>
+          <a:fontRef idx="minor">
+            <a:schemeClr val="tx1"/>
+          </a:fontRef>
+        </p:style>
+      </p:cxnSp>
+      <p:sp>
+        <p:nvSpPr>
+          <p:cNvPr id="92" name="TextBox 91">
+            <a:extLst>
+              <a:ext uri="{FF2B5EF4-FFF2-40B4-BE49-F238E27FC236}">
+                <a16:creationId xmlns:a16="http://schemas.microsoft.com/office/drawing/2014/main" id="{23FC311A-EBF9-3FAD-ECF0-F540413F6214}"/>
+              </a:ext>
+            </a:extLst>
+          </p:cNvPr>
+          <p:cNvSpPr txBox="1"/>
+          <p:nvPr/>
+        </p:nvSpPr>
+        <p:spPr>
+          <a:xfrm>
+            <a:off x="1658111" y="1254769"/>
+            <a:ext cx="867917" cy="817245"/>
+          </a:xfrm>
+          <a:prstGeom prst="roundRect">
+            <a:avLst/>
+          </a:prstGeom>
+          <a:noFill/>
+          <a:ln w="28575">
+            <a:solidFill>
+              <a:schemeClr val="tx1"/>
+            </a:solidFill>
+          </a:ln>
+        </p:spPr>
+        <p:style>
+          <a:lnRef idx="0">
+            <a:scrgbClr r="0" g="0" b="0"/>
+          </a:lnRef>
+          <a:fillRef idx="0">
+            <a:scrgbClr r="0" g="0" b="0"/>
+          </a:fillRef>
+          <a:effectRef idx="0">
+            <a:scrgbClr r="0" g="0" b="0"/>
+          </a:effectRef>
+          <a:fontRef idx="minor">
+            <a:schemeClr val="dk1"/>
+          </a:fontRef>
+        </p:style>
+        <p:txBody>
+          <a:bodyPr wrap="square" rtlCol="0">
+            <a:spAutoFit/>
+          </a:bodyPr>
+          <a:lstStyle/>
+          <a:p>
+            <a:pPr algn="ctr"/>
+            <a:r>
+              <a:rPr lang="en-GB" sz="1400" dirty="0"/>
+              <a:t>Servo</a:t>
+            </a:r>
+          </a:p>
+          <a:p>
+            <a:pPr algn="ctr"/>
+            <a:endParaRPr lang="en-GB" sz="1400" dirty="0"/>
+          </a:p>
+          <a:p>
+            <a:pPr algn="ctr"/>
+            <a:endParaRPr lang="en-GB" sz="1400" dirty="0"/>
+          </a:p>
+        </p:txBody>
+      </p:sp>
+      <p:sp>
+        <p:nvSpPr>
+          <p:cNvPr id="93" name="TextBox 92">
+            <a:extLst>
+              <a:ext uri="{FF2B5EF4-FFF2-40B4-BE49-F238E27FC236}">
+                <a16:creationId xmlns:a16="http://schemas.microsoft.com/office/drawing/2014/main" id="{957CC249-39BF-0BFF-3891-AC2CF4BBED30}"/>
+              </a:ext>
+            </a:extLst>
+          </p:cNvPr>
+          <p:cNvSpPr txBox="1"/>
+          <p:nvPr/>
+        </p:nvSpPr>
+        <p:spPr>
+          <a:xfrm>
+            <a:off x="1628585" y="1668462"/>
+            <a:ext cx="334979" cy="276999"/>
+          </a:xfrm>
+          <a:prstGeom prst="rect">
+            <a:avLst/>
+          </a:prstGeom>
+          <a:noFill/>
+        </p:spPr>
+        <p:txBody>
+          <a:bodyPr wrap="square" rtlCol="0">
+            <a:spAutoFit/>
+          </a:bodyPr>
+          <a:lstStyle/>
+          <a:p>
+            <a:pPr algn="ctr"/>
+            <a:r>
+              <a:rPr lang="en-GB" sz="1200" b="1" dirty="0"/>
+              <a:t>-</a:t>
+            </a:r>
+          </a:p>
+        </p:txBody>
+      </p:sp>
+      <p:sp>
+        <p:nvSpPr>
+          <p:cNvPr id="94" name="TextBox 93">
+            <a:extLst>
+              <a:ext uri="{FF2B5EF4-FFF2-40B4-BE49-F238E27FC236}">
+                <a16:creationId xmlns:a16="http://schemas.microsoft.com/office/drawing/2014/main" id="{E6FC3F92-151D-ADDF-E813-A4AF6D4BF856}"/>
+              </a:ext>
+            </a:extLst>
+          </p:cNvPr>
+          <p:cNvSpPr txBox="1"/>
+          <p:nvPr/>
+        </p:nvSpPr>
+        <p:spPr>
+          <a:xfrm>
+            <a:off x="1928544" y="1668463"/>
+            <a:ext cx="334979" cy="276999"/>
+          </a:xfrm>
+          <a:prstGeom prst="rect">
+            <a:avLst/>
+          </a:prstGeom>
+          <a:noFill/>
+        </p:spPr>
+        <p:txBody>
+          <a:bodyPr wrap="square" rtlCol="0">
+            <a:spAutoFit/>
+          </a:bodyPr>
+          <a:lstStyle/>
+          <a:p>
+            <a:pPr algn="ctr"/>
+            <a:r>
+              <a:rPr lang="en-GB" sz="1200" b="1" dirty="0"/>
+              <a:t>+</a:t>
+            </a:r>
+          </a:p>
+        </p:txBody>
+      </p:sp>
+      <p:sp>
+        <p:nvSpPr>
+          <p:cNvPr id="95" name="TextBox 94">
+            <a:extLst>
+              <a:ext uri="{FF2B5EF4-FFF2-40B4-BE49-F238E27FC236}">
+                <a16:creationId xmlns:a16="http://schemas.microsoft.com/office/drawing/2014/main" id="{3CFC9658-2AA2-4700-6B76-B15A64B1C649}"/>
+              </a:ext>
+            </a:extLst>
+          </p:cNvPr>
+          <p:cNvSpPr txBox="1"/>
+          <p:nvPr/>
+        </p:nvSpPr>
+        <p:spPr>
+          <a:xfrm rot="5400000">
+            <a:off x="2055428" y="1659000"/>
+            <a:ext cx="568432" cy="276999"/>
+          </a:xfrm>
+          <a:prstGeom prst="rect">
+            <a:avLst/>
+          </a:prstGeom>
+          <a:noFill/>
+        </p:spPr>
+        <p:txBody>
+          <a:bodyPr wrap="square" rtlCol="0">
+            <a:spAutoFit/>
+          </a:bodyPr>
+          <a:lstStyle/>
+          <a:p>
+            <a:pPr algn="ctr"/>
+            <a:r>
+              <a:rPr lang="en-GB" sz="1200" b="1" dirty="0"/>
+              <a:t>PWM</a:t>
+            </a:r>
+          </a:p>
+        </p:txBody>
+      </p:sp>
+      <p:sp>
+        <p:nvSpPr>
+          <p:cNvPr id="96" name="TextBox 95">
+            <a:extLst>
+              <a:ext uri="{FF2B5EF4-FFF2-40B4-BE49-F238E27FC236}">
+                <a16:creationId xmlns:a16="http://schemas.microsoft.com/office/drawing/2014/main" id="{3FF78E36-1714-192B-0F48-52B794FA2CA9}"/>
+              </a:ext>
+            </a:extLst>
+          </p:cNvPr>
+          <p:cNvSpPr txBox="1"/>
+          <p:nvPr/>
+        </p:nvSpPr>
+        <p:spPr>
+          <a:xfrm rot="16200000">
+            <a:off x="1346045" y="3352434"/>
+            <a:ext cx="1492050" cy="307777"/>
+          </a:xfrm>
+          <a:prstGeom prst="rect">
+            <a:avLst/>
+          </a:prstGeom>
+          <a:noFill/>
+        </p:spPr>
+        <p:txBody>
+          <a:bodyPr wrap="square" rtlCol="0">
+            <a:spAutoFit/>
+          </a:bodyPr>
+          <a:lstStyle/>
+          <a:p>
+            <a:r>
+              <a:rPr lang="en-GB" sz="1400" dirty="0"/>
+              <a:t>Big breadboard +</a:t>
+            </a:r>
+          </a:p>
+        </p:txBody>
+      </p:sp>
+      <p:sp>
+        <p:nvSpPr>
+          <p:cNvPr id="97" name="TextBox 96">
+            <a:extLst>
+              <a:ext uri="{FF2B5EF4-FFF2-40B4-BE49-F238E27FC236}">
+                <a16:creationId xmlns:a16="http://schemas.microsoft.com/office/drawing/2014/main" id="{715A959B-FA85-3D27-6990-395BA0A889B8}"/>
+              </a:ext>
+            </a:extLst>
+          </p:cNvPr>
+          <p:cNvSpPr txBox="1"/>
+          <p:nvPr/>
+        </p:nvSpPr>
+        <p:spPr>
+          <a:xfrm rot="16200000">
+            <a:off x="865177" y="3352433"/>
+            <a:ext cx="1492050" cy="307777"/>
+          </a:xfrm>
+          <a:prstGeom prst="rect">
+            <a:avLst/>
+          </a:prstGeom>
+          <a:noFill/>
+        </p:spPr>
+        <p:txBody>
+          <a:bodyPr wrap="square" rtlCol="0">
+            <a:spAutoFit/>
+          </a:bodyPr>
+          <a:lstStyle/>
+          <a:p>
+            <a:r>
+              <a:rPr lang="en-GB" sz="1400" dirty="0"/>
+              <a:t>Big breadboard -</a:t>
+            </a:r>
+          </a:p>
+        </p:txBody>
+      </p:sp>
+      <p:sp>
+        <p:nvSpPr>
+          <p:cNvPr id="98" name="TextBox 97">
+            <a:extLst>
+              <a:ext uri="{FF2B5EF4-FFF2-40B4-BE49-F238E27FC236}">
+                <a16:creationId xmlns:a16="http://schemas.microsoft.com/office/drawing/2014/main" id="{35745D70-5AEA-189B-66A6-3089F27F41C9}"/>
+              </a:ext>
+            </a:extLst>
+          </p:cNvPr>
+          <p:cNvSpPr txBox="1"/>
+          <p:nvPr/>
+        </p:nvSpPr>
+        <p:spPr>
+          <a:xfrm rot="16200000">
+            <a:off x="1998451" y="3341259"/>
+            <a:ext cx="1150390" cy="307777"/>
+          </a:xfrm>
+          <a:prstGeom prst="rect">
+            <a:avLst/>
+          </a:prstGeom>
+          <a:noFill/>
+          <a:ln>
+            <a:noFill/>
+          </a:ln>
+        </p:spPr>
+        <p:style>
+          <a:lnRef idx="0">
+            <a:scrgbClr r="0" g="0" b="0"/>
+          </a:lnRef>
+          <a:fillRef idx="0">
+            <a:scrgbClr r="0" g="0" b="0"/>
+          </a:fillRef>
+          <a:effectRef idx="0">
+            <a:scrgbClr r="0" g="0" b="0"/>
+          </a:effectRef>
+          <a:fontRef idx="minor">
+            <a:schemeClr val="dk1"/>
+          </a:fontRef>
+        </p:style>
+        <p:txBody>
+          <a:bodyPr wrap="square" rtlCol="0">
+            <a:spAutoFit/>
+          </a:bodyPr>
+          <a:lstStyle/>
+          <a:p>
+            <a:pPr algn="ctr"/>
+            <a:r>
+              <a:rPr lang="en-GB" sz="1400" dirty="0"/>
+              <a:t>Servo signal</a:t>
+            </a:r>
+          </a:p>
+        </p:txBody>
+      </p:sp>
+      <p:cxnSp>
+        <p:nvCxnSpPr>
+          <p:cNvPr id="99" name="Straight Connector 98">
+            <a:extLst>
+              <a:ext uri="{FF2B5EF4-FFF2-40B4-BE49-F238E27FC236}">
+                <a16:creationId xmlns:a16="http://schemas.microsoft.com/office/drawing/2014/main" id="{94BB16A0-B04D-E4E4-20F7-8C6F7D46C83B}"/>
+              </a:ext>
+            </a:extLst>
+          </p:cNvPr>
+          <p:cNvCxnSpPr>
+            <a:cxnSpLocks/>
+            <a:stCxn id="95" idx="3"/>
+            <a:endCxn id="98" idx="3"/>
+          </p:cNvCxnSpPr>
+          <p:nvPr/>
+        </p:nvCxnSpPr>
+        <p:spPr>
+          <a:xfrm>
+            <a:off x="2339644" y="2081716"/>
+            <a:ext cx="234003" cy="838237"/>
+          </a:xfrm>
+          <a:prstGeom prst="line">
+            <a:avLst/>
+          </a:prstGeom>
+          <a:ln>
+            <a:headEnd type="none" w="med" len="med"/>
+            <a:tailEnd type="arrow" w="med" len="med"/>
+          </a:ln>
+        </p:spPr>
+        <p:style>
+          <a:lnRef idx="1">
+            <a:schemeClr val="accent2"/>
+          </a:lnRef>
+          <a:fillRef idx="0">
+            <a:schemeClr val="accent2"/>
+          </a:fillRef>
+          <a:effectRef idx="0">
+            <a:schemeClr val="accent2"/>
+          </a:effectRef>
+          <a:fontRef idx="minor">
+            <a:schemeClr val="tx1"/>
+          </a:fontRef>
+        </p:style>
+      </p:cxnSp>
+      <p:cxnSp>
+        <p:nvCxnSpPr>
+          <p:cNvPr id="102" name="Straight Connector 101">
+            <a:extLst>
+              <a:ext uri="{FF2B5EF4-FFF2-40B4-BE49-F238E27FC236}">
+                <a16:creationId xmlns:a16="http://schemas.microsoft.com/office/drawing/2014/main" id="{68138F7B-BBDF-BDF7-EA7C-7C401CAAA77D}"/>
+              </a:ext>
+            </a:extLst>
+          </p:cNvPr>
+          <p:cNvCxnSpPr>
+            <a:cxnSpLocks/>
+            <a:stCxn id="92" idx="2"/>
+            <a:endCxn id="96" idx="3"/>
+          </p:cNvCxnSpPr>
+          <p:nvPr/>
+        </p:nvCxnSpPr>
+        <p:spPr>
+          <a:xfrm>
+            <a:off x="2092070" y="2072014"/>
+            <a:ext cx="1" cy="688284"/>
+          </a:xfrm>
+          <a:prstGeom prst="line">
+            <a:avLst/>
+          </a:prstGeom>
+          <a:ln>
+            <a:solidFill>
+              <a:srgbClr val="FF0000"/>
+            </a:solidFill>
+            <a:headEnd type="none" w="med" len="med"/>
+            <a:tailEnd type="arrow" w="med" len="med"/>
+          </a:ln>
+        </p:spPr>
+        <p:style>
+          <a:lnRef idx="2">
+            <a:schemeClr val="accent1"/>
+          </a:lnRef>
+          <a:fillRef idx="0">
+            <a:schemeClr val="accent1"/>
+          </a:fillRef>
+          <a:effectRef idx="1">
+            <a:schemeClr val="accent1"/>
+          </a:effectRef>
+          <a:fontRef idx="minor">
+            <a:schemeClr val="tx1"/>
+          </a:fontRef>
+        </p:style>
+      </p:cxnSp>
+      <p:cxnSp>
+        <p:nvCxnSpPr>
+          <p:cNvPr id="105" name="Straight Connector 104">
+            <a:extLst>
+              <a:ext uri="{FF2B5EF4-FFF2-40B4-BE49-F238E27FC236}">
+                <a16:creationId xmlns:a16="http://schemas.microsoft.com/office/drawing/2014/main" id="{2FEBC288-2D55-7E68-6AF4-F71F099DA3B9}"/>
+              </a:ext>
+            </a:extLst>
+          </p:cNvPr>
+          <p:cNvCxnSpPr>
+            <a:cxnSpLocks/>
+            <a:endCxn id="97" idx="3"/>
+          </p:cNvCxnSpPr>
+          <p:nvPr/>
+        </p:nvCxnSpPr>
+        <p:spPr>
+          <a:xfrm flipH="1">
+            <a:off x="1611203" y="2072014"/>
+            <a:ext cx="123188" cy="688283"/>
+          </a:xfrm>
+          <a:prstGeom prst="line">
+            <a:avLst/>
+          </a:prstGeom>
+          <a:ln>
+            <a:headEnd type="none" w="med" len="med"/>
+            <a:tailEnd type="arrow" w="med" len="med"/>
+          </a:ln>
+        </p:spPr>
+        <p:style>
+          <a:lnRef idx="1">
+            <a:schemeClr val="dk1"/>
+          </a:lnRef>
+          <a:fillRef idx="0">
+            <a:schemeClr val="dk1"/>
+          </a:fillRef>
+          <a:effectRef idx="0">
+            <a:schemeClr val="dk1"/>
+          </a:effectRef>
+          <a:fontRef idx="minor">
+            <a:schemeClr val="tx1"/>
+          </a:fontRef>
+        </p:style>
+      </p:cxnSp>
+    </p:spTree>
+    <p:extLst>
+      <p:ext uri="{BB962C8B-B14F-4D97-AF65-F5344CB8AC3E}">
+        <p14:creationId xmlns:p14="http://schemas.microsoft.com/office/powerpoint/2010/main" val="4126168595"/>
+      </p:ext>
+    </p:extLst>
+  </p:cSld>
+  <p:clrMapOvr>
+    <a:masterClrMapping/>
+  </p:clrMapOvr>
+</p:sld>
+</file>
+
+<file path=ppt/slides/slide3.xml><?xml version="1.0" encoding="utf-8"?>
+<p:sld xmlns:a="http://schemas.openxmlformats.org/drawingml/2006/main" xmlns:r="http://schemas.openxmlformats.org/officeDocument/2006/relationships" xmlns:p="http://schemas.openxmlformats.org/presentationml/2006/main">
+  <p:cSld>
+    <p:spTree>
+      <p:nvGrpSpPr>
+        <p:cNvPr id="1" name=""/>
+        <p:cNvGrpSpPr/>
+        <p:nvPr/>
+      </p:nvGrpSpPr>
+      <p:grpSpPr>
+        <a:xfrm>
+          <a:off x="0" y="0"/>
+          <a:ext cx="0" cy="0"/>
+          <a:chOff x="0" y="0"/>
+          <a:chExt cx="0" cy="0"/>
+        </a:xfrm>
+      </p:grpSpPr>
+      <p:pic>
+        <p:nvPicPr>
+          <p:cNvPr id="2" name="Picture 1">
+            <a:extLst>
+              <a:ext uri="{FF2B5EF4-FFF2-40B4-BE49-F238E27FC236}">
+                <a16:creationId xmlns:a16="http://schemas.microsoft.com/office/drawing/2014/main" id="{AE5723CC-5A8A-CC5F-C0FD-408ED5B8CF69}"/>
+              </a:ext>
+            </a:extLst>
+          </p:cNvPr>
+          <p:cNvPicPr>
+            <a:picLocks noChangeAspect="1"/>
+          </p:cNvPicPr>
+          <p:nvPr/>
+        </p:nvPicPr>
+        <p:blipFill>
+          <a:blip r:embed="rId2"/>
+          <a:stretch>
+            <a:fillRect/>
+          </a:stretch>
+        </p:blipFill>
+        <p:spPr>
+          <a:xfrm>
+            <a:off x="3840932" y="490464"/>
+            <a:ext cx="6804300" cy="4607271"/>
+          </a:xfrm>
+          <a:prstGeom prst="rect">
+            <a:avLst/>
+          </a:prstGeom>
+          <a:ln>
+            <a:solidFill>
+              <a:schemeClr val="tx1"/>
+            </a:solidFill>
+          </a:ln>
+        </p:spPr>
+      </p:pic>
+      <p:pic>
+        <p:nvPicPr>
+          <p:cNvPr id="3" name="Picture 2">
+            <a:extLst>
+              <a:ext uri="{FF2B5EF4-FFF2-40B4-BE49-F238E27FC236}">
+                <a16:creationId xmlns:a16="http://schemas.microsoft.com/office/drawing/2014/main" id="{B0913542-1973-843A-E034-5B0405B54FB3}"/>
+              </a:ext>
+            </a:extLst>
+          </p:cNvPr>
+          <p:cNvPicPr>
+            <a:picLocks noChangeAspect="1"/>
+          </p:cNvPicPr>
+          <p:nvPr/>
+        </p:nvPicPr>
+        <p:blipFill>
+          <a:blip r:embed="rId3"/>
+          <a:stretch>
+            <a:fillRect/>
+          </a:stretch>
+        </p:blipFill>
+        <p:spPr>
+          <a:xfrm>
+            <a:off x="10801132" y="2046393"/>
+            <a:ext cx="875757" cy="1978415"/>
+          </a:xfrm>
+          <a:prstGeom prst="rect">
+            <a:avLst/>
+          </a:prstGeom>
+          <a:ln>
+            <a:solidFill>
+              <a:schemeClr val="tx1"/>
+            </a:solidFill>
+          </a:ln>
+        </p:spPr>
+      </p:pic>
+      <p:pic>
+        <p:nvPicPr>
+          <p:cNvPr id="4" name="Picture 3">
+            <a:extLst>
+              <a:ext uri="{FF2B5EF4-FFF2-40B4-BE49-F238E27FC236}">
+                <a16:creationId xmlns:a16="http://schemas.microsoft.com/office/drawing/2014/main" id="{D12F4D96-DEDA-CB3C-D8ED-D8677934954F}"/>
+              </a:ext>
+            </a:extLst>
+          </p:cNvPr>
+          <p:cNvPicPr>
+            <a:picLocks noChangeAspect="1"/>
+          </p:cNvPicPr>
+          <p:nvPr/>
+        </p:nvPicPr>
+        <p:blipFill>
+          <a:blip r:embed="rId4"/>
+          <a:stretch>
+            <a:fillRect/>
+          </a:stretch>
+        </p:blipFill>
+        <p:spPr>
+          <a:xfrm>
+            <a:off x="97289" y="1162900"/>
+            <a:ext cx="3587743" cy="3745403"/>
+          </a:xfrm>
+          <a:prstGeom prst="rect">
+            <a:avLst/>
+          </a:prstGeom>
+          <a:ln>
+            <a:solidFill>
+              <a:schemeClr val="tx1"/>
+            </a:solidFill>
+          </a:ln>
+        </p:spPr>
+      </p:pic>
+    </p:spTree>
+    <p:extLst>
+      <p:ext uri="{BB962C8B-B14F-4D97-AF65-F5344CB8AC3E}">
+        <p14:creationId xmlns:p14="http://schemas.microsoft.com/office/powerpoint/2010/main" val="3547389176"/>
+      </p:ext>
+    </p:extLst>
+  </p:cSld>
+  <p:clrMapOvr>
+    <a:masterClrMapping/>
+  </p:clrMapOvr>
+</p:sld>
+</file>
+
+<file path=ppt/slides/slide4.xml><?xml version="1.0" encoding="utf-8"?>
+<p:sld xmlns:a="http://schemas.openxmlformats.org/drawingml/2006/main" xmlns:r="http://schemas.openxmlformats.org/officeDocument/2006/relationships" xmlns:p="http://schemas.openxmlformats.org/presentationml/2006/main">
+  <p:cSld>
+    <p:spTree>
+      <p:nvGrpSpPr>
+        <p:cNvPr id="1" name=""/>
+        <p:cNvGrpSpPr/>
+        <p:nvPr/>
+      </p:nvGrpSpPr>
+      <p:grpSpPr>
+        <a:xfrm>
+          <a:off x="0" y="0"/>
+          <a:ext cx="0" cy="0"/>
+          <a:chOff x="0" y="0"/>
+          <a:chExt cx="0" cy="0"/>
+        </a:xfrm>
+      </p:grpSpPr>
+      <p:pic>
+        <p:nvPicPr>
+          <p:cNvPr id="2" name="Picture 1">
+            <a:extLst>
+              <a:ext uri="{FF2B5EF4-FFF2-40B4-BE49-F238E27FC236}">
+                <a16:creationId xmlns:a16="http://schemas.microsoft.com/office/drawing/2014/main" id="{DB82FD2C-113D-08F0-D4E3-35F250FEF169}"/>
+              </a:ext>
+            </a:extLst>
+          </p:cNvPr>
+          <p:cNvPicPr>
+            <a:picLocks noChangeAspect="1"/>
+          </p:cNvPicPr>
+          <p:nvPr/>
+        </p:nvPicPr>
+        <p:blipFill>
+          <a:blip r:embed="rId2"/>
+          <a:stretch>
+            <a:fillRect/>
+          </a:stretch>
+        </p:blipFill>
+        <p:spPr>
+          <a:xfrm>
+            <a:off x="292105" y="1112319"/>
+            <a:ext cx="11607790" cy="4633362"/>
+          </a:xfrm>
+          <a:prstGeom prst="rect">
+            <a:avLst/>
+          </a:prstGeom>
+        </p:spPr>
+      </p:pic>
+    </p:spTree>
+    <p:extLst>
+      <p:ext uri="{BB962C8B-B14F-4D97-AF65-F5344CB8AC3E}">
+        <p14:creationId xmlns:p14="http://schemas.microsoft.com/office/powerpoint/2010/main" val="1976924870"/>
       </p:ext>
     </p:extLst>
   </p:cSld>

</xml_diff>

<commit_message>
updated materials.xlsx, schematic.pptx & multithreaded code (might not be needed though, the single core code worked better than expected). added datasheet for gearbox motor.
</commit_message>
<xml_diff>
--- a/pico/dev/schematic.pptx
+++ b/pico/dev/schematic.pptx
@@ -262,7 +262,7 @@
           <a:p>
             <a:fld id="{ED0355D1-E75F-4E22-96B7-73DAB928A2C2}" type="datetimeFigureOut">
               <a:rPr lang="en-GB" smtClean="0"/>
-              <a:t>18/04/2025</a:t>
+              <a:t>20/04/2025</a:t>
             </a:fld>
             <a:endParaRPr lang="en-GB"/>
           </a:p>
@@ -460,7 +460,7 @@
           <a:p>
             <a:fld id="{ED0355D1-E75F-4E22-96B7-73DAB928A2C2}" type="datetimeFigureOut">
               <a:rPr lang="en-GB" smtClean="0"/>
-              <a:t>18/04/2025</a:t>
+              <a:t>20/04/2025</a:t>
             </a:fld>
             <a:endParaRPr lang="en-GB"/>
           </a:p>
@@ -668,7 +668,7 @@
           <a:p>
             <a:fld id="{ED0355D1-E75F-4E22-96B7-73DAB928A2C2}" type="datetimeFigureOut">
               <a:rPr lang="en-GB" smtClean="0"/>
-              <a:t>18/04/2025</a:t>
+              <a:t>20/04/2025</a:t>
             </a:fld>
             <a:endParaRPr lang="en-GB"/>
           </a:p>
@@ -866,7 +866,7 @@
           <a:p>
             <a:fld id="{ED0355D1-E75F-4E22-96B7-73DAB928A2C2}" type="datetimeFigureOut">
               <a:rPr lang="en-GB" smtClean="0"/>
-              <a:t>18/04/2025</a:t>
+              <a:t>20/04/2025</a:t>
             </a:fld>
             <a:endParaRPr lang="en-GB"/>
           </a:p>
@@ -1141,7 +1141,7 @@
           <a:p>
             <a:fld id="{ED0355D1-E75F-4E22-96B7-73DAB928A2C2}" type="datetimeFigureOut">
               <a:rPr lang="en-GB" smtClean="0"/>
-              <a:t>18/04/2025</a:t>
+              <a:t>20/04/2025</a:t>
             </a:fld>
             <a:endParaRPr lang="en-GB"/>
           </a:p>
@@ -1406,7 +1406,7 @@
           <a:p>
             <a:fld id="{ED0355D1-E75F-4E22-96B7-73DAB928A2C2}" type="datetimeFigureOut">
               <a:rPr lang="en-GB" smtClean="0"/>
-              <a:t>18/04/2025</a:t>
+              <a:t>20/04/2025</a:t>
             </a:fld>
             <a:endParaRPr lang="en-GB"/>
           </a:p>
@@ -1818,7 +1818,7 @@
           <a:p>
             <a:fld id="{ED0355D1-E75F-4E22-96B7-73DAB928A2C2}" type="datetimeFigureOut">
               <a:rPr lang="en-GB" smtClean="0"/>
-              <a:t>18/04/2025</a:t>
+              <a:t>20/04/2025</a:t>
             </a:fld>
             <a:endParaRPr lang="en-GB"/>
           </a:p>
@@ -1959,7 +1959,7 @@
           <a:p>
             <a:fld id="{ED0355D1-E75F-4E22-96B7-73DAB928A2C2}" type="datetimeFigureOut">
               <a:rPr lang="en-GB" smtClean="0"/>
-              <a:t>18/04/2025</a:t>
+              <a:t>20/04/2025</a:t>
             </a:fld>
             <a:endParaRPr lang="en-GB"/>
           </a:p>
@@ -2072,7 +2072,7 @@
           <a:p>
             <a:fld id="{ED0355D1-E75F-4E22-96B7-73DAB928A2C2}" type="datetimeFigureOut">
               <a:rPr lang="en-GB" smtClean="0"/>
-              <a:t>18/04/2025</a:t>
+              <a:t>20/04/2025</a:t>
             </a:fld>
             <a:endParaRPr lang="en-GB"/>
           </a:p>
@@ -2383,7 +2383,7 @@
           <a:p>
             <a:fld id="{ED0355D1-E75F-4E22-96B7-73DAB928A2C2}" type="datetimeFigureOut">
               <a:rPr lang="en-GB" smtClean="0"/>
-              <a:t>18/04/2025</a:t>
+              <a:t>20/04/2025</a:t>
             </a:fld>
             <a:endParaRPr lang="en-GB"/>
           </a:p>
@@ -2671,7 +2671,7 @@
           <a:p>
             <a:fld id="{ED0355D1-E75F-4E22-96B7-73DAB928A2C2}" type="datetimeFigureOut">
               <a:rPr lang="en-GB" smtClean="0"/>
-              <a:t>18/04/2025</a:t>
+              <a:t>20/04/2025</a:t>
             </a:fld>
             <a:endParaRPr lang="en-GB"/>
           </a:p>
@@ -2912,7 +2912,7 @@
           <a:p>
             <a:fld id="{ED0355D1-E75F-4E22-96B7-73DAB928A2C2}" type="datetimeFigureOut">
               <a:rPr lang="en-GB" smtClean="0"/>
-              <a:t>18/04/2025</a:t>
+              <a:t>20/04/2025</a:t>
             </a:fld>
             <a:endParaRPr lang="en-GB"/>
           </a:p>
@@ -5387,6 +5387,146 @@
           </a:p>
         </p:txBody>
       </p:sp>
+      <p:sp>
+        <p:nvSpPr>
+          <p:cNvPr id="4" name="TextBox 3">
+            <a:extLst>
+              <a:ext uri="{FF2B5EF4-FFF2-40B4-BE49-F238E27FC236}">
+                <a16:creationId xmlns:a16="http://schemas.microsoft.com/office/drawing/2014/main" id="{C752EB38-AE8D-8A09-4A3C-66AF9E129A06}"/>
+              </a:ext>
+            </a:extLst>
+          </p:cNvPr>
+          <p:cNvSpPr txBox="1"/>
+          <p:nvPr/>
+        </p:nvSpPr>
+        <p:spPr>
+          <a:xfrm>
+            <a:off x="398685" y="155536"/>
+            <a:ext cx="6525990" cy="369332"/>
+          </a:xfrm>
+          <a:prstGeom prst="rect">
+            <a:avLst/>
+          </a:prstGeom>
+          <a:noFill/>
+        </p:spPr>
+        <p:txBody>
+          <a:bodyPr wrap="square" rtlCol="0">
+            <a:spAutoFit/>
+          </a:bodyPr>
+          <a:lstStyle/>
+          <a:p>
+            <a:r>
+              <a:rPr lang="en-GB" dirty="0"/>
+              <a:t>6 male-female jumpers (without external power source)</a:t>
+            </a:r>
+          </a:p>
+        </p:txBody>
+      </p:sp>
+      <p:sp>
+        <p:nvSpPr>
+          <p:cNvPr id="8" name="TextBox 7">
+            <a:extLst>
+              <a:ext uri="{FF2B5EF4-FFF2-40B4-BE49-F238E27FC236}">
+                <a16:creationId xmlns:a16="http://schemas.microsoft.com/office/drawing/2014/main" id="{18427A68-AA32-1F6D-7F96-7191021B650C}"/>
+              </a:ext>
+            </a:extLst>
+          </p:cNvPr>
+          <p:cNvSpPr txBox="1"/>
+          <p:nvPr/>
+        </p:nvSpPr>
+        <p:spPr>
+          <a:xfrm>
+            <a:off x="543821" y="6004249"/>
+            <a:ext cx="2354287" cy="369332"/>
+          </a:xfrm>
+          <a:prstGeom prst="rect">
+            <a:avLst/>
+          </a:prstGeom>
+          <a:noFill/>
+        </p:spPr>
+        <p:txBody>
+          <a:bodyPr wrap="square" rtlCol="0">
+            <a:spAutoFit/>
+          </a:bodyPr>
+          <a:lstStyle/>
+          <a:p>
+            <a:r>
+              <a:rPr lang="en-GB" dirty="0"/>
+              <a:t>2 male-male jumpers</a:t>
+            </a:r>
+          </a:p>
+        </p:txBody>
+      </p:sp>
+      <p:sp>
+        <p:nvSpPr>
+          <p:cNvPr id="10" name="TextBox 9">
+            <a:extLst>
+              <a:ext uri="{FF2B5EF4-FFF2-40B4-BE49-F238E27FC236}">
+                <a16:creationId xmlns:a16="http://schemas.microsoft.com/office/drawing/2014/main" id="{B887EA7F-1724-A3B1-2F7D-D84194DE6E11}"/>
+              </a:ext>
+            </a:extLst>
+          </p:cNvPr>
+          <p:cNvSpPr txBox="1"/>
+          <p:nvPr/>
+        </p:nvSpPr>
+        <p:spPr>
+          <a:xfrm>
+            <a:off x="398685" y="589112"/>
+            <a:ext cx="6525990" cy="369332"/>
+          </a:xfrm>
+          <a:prstGeom prst="rect">
+            <a:avLst/>
+          </a:prstGeom>
+          <a:noFill/>
+        </p:spPr>
+        <p:txBody>
+          <a:bodyPr wrap="square" rtlCol="0">
+            <a:spAutoFit/>
+          </a:bodyPr>
+          <a:lstStyle/>
+          <a:p>
+            <a:r>
+              <a:rPr lang="en-GB" dirty="0"/>
+              <a:t>9 (??) male-female jumpers (with external power source)</a:t>
+            </a:r>
+          </a:p>
+        </p:txBody>
+      </p:sp>
+      <p:sp>
+        <p:nvSpPr>
+          <p:cNvPr id="13" name="TextBox 12">
+            <a:extLst>
+              <a:ext uri="{FF2B5EF4-FFF2-40B4-BE49-F238E27FC236}">
+                <a16:creationId xmlns:a16="http://schemas.microsoft.com/office/drawing/2014/main" id="{F0F654D7-DB78-A959-9497-6B8E0AA705B3}"/>
+              </a:ext>
+            </a:extLst>
+          </p:cNvPr>
+          <p:cNvSpPr txBox="1"/>
+          <p:nvPr/>
+        </p:nvSpPr>
+        <p:spPr>
+          <a:xfrm>
+            <a:off x="410084" y="962100"/>
+            <a:ext cx="6525990" cy="369332"/>
+          </a:xfrm>
+          <a:prstGeom prst="rect">
+            <a:avLst/>
+          </a:prstGeom>
+          <a:noFill/>
+        </p:spPr>
+        <p:txBody>
+          <a:bodyPr wrap="square" rtlCol="0">
+            <a:spAutoFit/>
+          </a:bodyPr>
+          <a:lstStyle/>
+          <a:p>
+            <a:r>
+              <a:rPr lang="en-GB" dirty="0"/>
+              <a:t>2 (??) female-female jumpers (with external power source)</a:t>
+            </a:r>
+          </a:p>
+        </p:txBody>
+      </p:sp>
     </p:spTree>
     <p:extLst>
       <p:ext uri="{BB962C8B-B14F-4D97-AF65-F5344CB8AC3E}">
@@ -7849,6 +7989,76 @@
           </a:fontRef>
         </p:style>
       </p:cxnSp>
+      <p:sp>
+        <p:nvSpPr>
+          <p:cNvPr id="24" name="TextBox 23">
+            <a:extLst>
+              <a:ext uri="{FF2B5EF4-FFF2-40B4-BE49-F238E27FC236}">
+                <a16:creationId xmlns:a16="http://schemas.microsoft.com/office/drawing/2014/main" id="{47F7F193-9970-676A-0706-80188637779A}"/>
+              </a:ext>
+            </a:extLst>
+          </p:cNvPr>
+          <p:cNvSpPr txBox="1"/>
+          <p:nvPr/>
+        </p:nvSpPr>
+        <p:spPr>
+          <a:xfrm>
+            <a:off x="761037" y="4785987"/>
+            <a:ext cx="2354287" cy="369332"/>
+          </a:xfrm>
+          <a:prstGeom prst="rect">
+            <a:avLst/>
+          </a:prstGeom>
+          <a:noFill/>
+        </p:spPr>
+        <p:txBody>
+          <a:bodyPr wrap="square" rtlCol="0">
+            <a:spAutoFit/>
+          </a:bodyPr>
+          <a:lstStyle/>
+          <a:p>
+            <a:r>
+              <a:rPr lang="en-GB" dirty="0"/>
+              <a:t>3 male-male jumpers</a:t>
+            </a:r>
+          </a:p>
+        </p:txBody>
+      </p:sp>
+      <p:sp>
+        <p:nvSpPr>
+          <p:cNvPr id="25" name="TextBox 24">
+            <a:extLst>
+              <a:ext uri="{FF2B5EF4-FFF2-40B4-BE49-F238E27FC236}">
+                <a16:creationId xmlns:a16="http://schemas.microsoft.com/office/drawing/2014/main" id="{E952C109-B256-7484-3938-AF5859F4F253}"/>
+              </a:ext>
+            </a:extLst>
+          </p:cNvPr>
+          <p:cNvSpPr txBox="1"/>
+          <p:nvPr/>
+        </p:nvSpPr>
+        <p:spPr>
+          <a:xfrm>
+            <a:off x="7388677" y="6388391"/>
+            <a:ext cx="3034675" cy="369332"/>
+          </a:xfrm>
+          <a:prstGeom prst="rect">
+            <a:avLst/>
+          </a:prstGeom>
+          <a:noFill/>
+        </p:spPr>
+        <p:txBody>
+          <a:bodyPr wrap="square" rtlCol="0">
+            <a:spAutoFit/>
+          </a:bodyPr>
+          <a:lstStyle/>
+          <a:p>
+            <a:r>
+              <a:rPr lang="en-GB" dirty="0"/>
+              <a:t>12 male-male jumpers</a:t>
+            </a:r>
+          </a:p>
+        </p:txBody>
+      </p:sp>
     </p:spTree>
     <p:extLst>
       <p:ext uri="{BB962C8B-B14F-4D97-AF65-F5344CB8AC3E}">

</xml_diff>

<commit_message>
updated materials list and schematic
</commit_message>
<xml_diff>
--- a/pico/dev/schematic.pptx
+++ b/pico/dev/schematic.pptx
@@ -2,13 +2,15 @@
 <file path=ppt/presentation.xml><?xml version="1.0" encoding="utf-8"?>
 <p:presentation xmlns:a="http://schemas.openxmlformats.org/drawingml/2006/main" xmlns:r="http://schemas.openxmlformats.org/officeDocument/2006/relationships" xmlns:p="http://schemas.openxmlformats.org/presentationml/2006/main" saveSubsetFonts="1">
   <p:sldMasterIdLst>
-    <p:sldMasterId id="2147483648" r:id="rId1"/>
+    <p:sldMasterId id="2147483648" r:id="rId4"/>
   </p:sldMasterIdLst>
   <p:sldIdLst>
-    <p:sldId id="257" r:id="rId2"/>
-    <p:sldId id="258" r:id="rId3"/>
-    <p:sldId id="259" r:id="rId4"/>
-    <p:sldId id="260" r:id="rId5"/>
+    <p:sldId id="257" r:id="rId5"/>
+    <p:sldId id="258" r:id="rId6"/>
+    <p:sldId id="259" r:id="rId7"/>
+    <p:sldId id="260" r:id="rId8"/>
+    <p:sldId id="261" r:id="rId9"/>
+    <p:sldId id="262" r:id="rId10"/>
   </p:sldIdLst>
   <p:sldSz cx="12192000" cy="6858000"/>
   <p:notesSz cx="6858000" cy="9144000"/>
@@ -115,6 +117,14 @@
 </p:presentation>
 </file>
 
+<file path=ppt/revisionInfo.xml><?xml version="1.0" encoding="utf-8"?>
+<p1510:revInfo xmlns:a="http://schemas.openxmlformats.org/drawingml/2006/main" xmlns:r="http://schemas.openxmlformats.org/officeDocument/2006/relationships" xmlns:p1510="http://schemas.microsoft.com/office/powerpoint/2015/10/main">
+  <p1510:revLst>
+    <p1510:client id="{DEF7779A-1803-4DBC-B9B9-49CBA81173D3}" v="4" dt="2025-04-29T17:20:59.054"/>
+  </p1510:revLst>
+</p1510:revInfo>
+</file>
+
 <file path=ppt/slideLayouts/slideLayout1.xml><?xml version="1.0" encoding="utf-8"?>
 <p:sldLayout xmlns:a="http://schemas.openxmlformats.org/drawingml/2006/main" xmlns:r="http://schemas.openxmlformats.org/officeDocument/2006/relationships" xmlns:p="http://schemas.openxmlformats.org/presentationml/2006/main" type="title" preserve="1">
   <p:cSld name="Title Slide">
@@ -262,7 +272,7 @@
           <a:p>
             <a:fld id="{ED0355D1-E75F-4E22-96B7-73DAB928A2C2}" type="datetimeFigureOut">
               <a:rPr lang="en-GB" smtClean="0"/>
-              <a:t>20/04/2025</a:t>
+              <a:t>29/04/2025</a:t>
             </a:fld>
             <a:endParaRPr lang="en-GB"/>
           </a:p>
@@ -460,7 +470,7 @@
           <a:p>
             <a:fld id="{ED0355D1-E75F-4E22-96B7-73DAB928A2C2}" type="datetimeFigureOut">
               <a:rPr lang="en-GB" smtClean="0"/>
-              <a:t>20/04/2025</a:t>
+              <a:t>29/04/2025</a:t>
             </a:fld>
             <a:endParaRPr lang="en-GB"/>
           </a:p>
@@ -668,7 +678,7 @@
           <a:p>
             <a:fld id="{ED0355D1-E75F-4E22-96B7-73DAB928A2C2}" type="datetimeFigureOut">
               <a:rPr lang="en-GB" smtClean="0"/>
-              <a:t>20/04/2025</a:t>
+              <a:t>29/04/2025</a:t>
             </a:fld>
             <a:endParaRPr lang="en-GB"/>
           </a:p>
@@ -866,7 +876,7 @@
           <a:p>
             <a:fld id="{ED0355D1-E75F-4E22-96B7-73DAB928A2C2}" type="datetimeFigureOut">
               <a:rPr lang="en-GB" smtClean="0"/>
-              <a:t>20/04/2025</a:t>
+              <a:t>29/04/2025</a:t>
             </a:fld>
             <a:endParaRPr lang="en-GB"/>
           </a:p>
@@ -1141,7 +1151,7 @@
           <a:p>
             <a:fld id="{ED0355D1-E75F-4E22-96B7-73DAB928A2C2}" type="datetimeFigureOut">
               <a:rPr lang="en-GB" smtClean="0"/>
-              <a:t>20/04/2025</a:t>
+              <a:t>29/04/2025</a:t>
             </a:fld>
             <a:endParaRPr lang="en-GB"/>
           </a:p>
@@ -1406,7 +1416,7 @@
           <a:p>
             <a:fld id="{ED0355D1-E75F-4E22-96B7-73DAB928A2C2}" type="datetimeFigureOut">
               <a:rPr lang="en-GB" smtClean="0"/>
-              <a:t>20/04/2025</a:t>
+              <a:t>29/04/2025</a:t>
             </a:fld>
             <a:endParaRPr lang="en-GB"/>
           </a:p>
@@ -1818,7 +1828,7 @@
           <a:p>
             <a:fld id="{ED0355D1-E75F-4E22-96B7-73DAB928A2C2}" type="datetimeFigureOut">
               <a:rPr lang="en-GB" smtClean="0"/>
-              <a:t>20/04/2025</a:t>
+              <a:t>29/04/2025</a:t>
             </a:fld>
             <a:endParaRPr lang="en-GB"/>
           </a:p>
@@ -1959,7 +1969,7 @@
           <a:p>
             <a:fld id="{ED0355D1-E75F-4E22-96B7-73DAB928A2C2}" type="datetimeFigureOut">
               <a:rPr lang="en-GB" smtClean="0"/>
-              <a:t>20/04/2025</a:t>
+              <a:t>29/04/2025</a:t>
             </a:fld>
             <a:endParaRPr lang="en-GB"/>
           </a:p>
@@ -2072,7 +2082,7 @@
           <a:p>
             <a:fld id="{ED0355D1-E75F-4E22-96B7-73DAB928A2C2}" type="datetimeFigureOut">
               <a:rPr lang="en-GB" smtClean="0"/>
-              <a:t>20/04/2025</a:t>
+              <a:t>29/04/2025</a:t>
             </a:fld>
             <a:endParaRPr lang="en-GB"/>
           </a:p>
@@ -2383,7 +2393,7 @@
           <a:p>
             <a:fld id="{ED0355D1-E75F-4E22-96B7-73DAB928A2C2}" type="datetimeFigureOut">
               <a:rPr lang="en-GB" smtClean="0"/>
-              <a:t>20/04/2025</a:t>
+              <a:t>29/04/2025</a:t>
             </a:fld>
             <a:endParaRPr lang="en-GB"/>
           </a:p>
@@ -2671,7 +2681,7 @@
           <a:p>
             <a:fld id="{ED0355D1-E75F-4E22-96B7-73DAB928A2C2}" type="datetimeFigureOut">
               <a:rPr lang="en-GB" smtClean="0"/>
-              <a:t>20/04/2025</a:t>
+              <a:t>29/04/2025</a:t>
             </a:fld>
             <a:endParaRPr lang="en-GB"/>
           </a:p>
@@ -2912,7 +2922,7 @@
           <a:p>
             <a:fld id="{ED0355D1-E75F-4E22-96B7-73DAB928A2C2}" type="datetimeFigureOut">
               <a:rPr lang="en-GB" smtClean="0"/>
-              <a:t>20/04/2025</a:t>
+              <a:t>29/04/2025</a:t>
             </a:fld>
             <a:endParaRPr lang="en-GB"/>
           </a:p>
@@ -4995,45 +5005,6 @@
           </a:fontRef>
         </p:style>
       </p:cxnSp>
-      <p:cxnSp>
-        <p:nvCxnSpPr>
-          <p:cNvPr id="118" name="Straight Connector 117">
-            <a:extLst>
-              <a:ext uri="{FF2B5EF4-FFF2-40B4-BE49-F238E27FC236}">
-                <a16:creationId xmlns:a16="http://schemas.microsoft.com/office/drawing/2014/main" id="{C63F2B51-EFE5-2A71-3B46-FFD9F2711079}"/>
-              </a:ext>
-            </a:extLst>
-          </p:cNvPr>
-          <p:cNvCxnSpPr>
-            <a:cxnSpLocks/>
-          </p:cNvCxnSpPr>
-          <p:nvPr/>
-        </p:nvCxnSpPr>
-        <p:spPr>
-          <a:xfrm>
-            <a:off x="9960830" y="1140803"/>
-            <a:ext cx="890924" cy="11575"/>
-          </a:xfrm>
-          <a:prstGeom prst="line">
-            <a:avLst/>
-          </a:prstGeom>
-          <a:ln/>
-        </p:spPr>
-        <p:style>
-          <a:lnRef idx="1">
-            <a:schemeClr val="dk1"/>
-          </a:lnRef>
-          <a:fillRef idx="0">
-            <a:schemeClr val="dk1"/>
-          </a:fillRef>
-          <a:effectRef idx="0">
-            <a:schemeClr val="dk1"/>
-          </a:effectRef>
-          <a:fontRef idx="minor">
-            <a:schemeClr val="tx1"/>
-          </a:fontRef>
-        </p:style>
-      </p:cxnSp>
       <p:sp>
         <p:nvSpPr>
           <p:cNvPr id="121" name="TextBox 120">
@@ -5389,10 +5360,10 @@
       </p:sp>
       <p:sp>
         <p:nvSpPr>
-          <p:cNvPr id="4" name="TextBox 3">
-            <a:extLst>
-              <a:ext uri="{FF2B5EF4-FFF2-40B4-BE49-F238E27FC236}">
-                <a16:creationId xmlns:a16="http://schemas.microsoft.com/office/drawing/2014/main" id="{C752EB38-AE8D-8A09-4A3C-66AF9E129A06}"/>
+          <p:cNvPr id="10" name="TextBox 9">
+            <a:extLst>
+              <a:ext uri="{FF2B5EF4-FFF2-40B4-BE49-F238E27FC236}">
+                <a16:creationId xmlns:a16="http://schemas.microsoft.com/office/drawing/2014/main" id="{B887EA7F-1724-A3B1-2F7D-D84194DE6E11}"/>
               </a:ext>
             </a:extLst>
           </p:cNvPr>
@@ -5401,8 +5372,8 @@
         </p:nvSpPr>
         <p:spPr>
           <a:xfrm>
-            <a:off x="398685" y="155536"/>
-            <a:ext cx="6525990" cy="369332"/>
+            <a:off x="398685" y="589112"/>
+            <a:ext cx="6525990" cy="646331"/>
           </a:xfrm>
           <a:prstGeom prst="rect">
             <a:avLst/>
@@ -5417,112 +5388,13 @@
           <a:p>
             <a:r>
               <a:rPr lang="en-GB" dirty="0"/>
-              <a:t>6 male-female jumpers (without external power source)</a:t>
-            </a:r>
-          </a:p>
-        </p:txBody>
-      </p:sp>
-      <p:sp>
-        <p:nvSpPr>
-          <p:cNvPr id="8" name="TextBox 7">
-            <a:extLst>
-              <a:ext uri="{FF2B5EF4-FFF2-40B4-BE49-F238E27FC236}">
-                <a16:creationId xmlns:a16="http://schemas.microsoft.com/office/drawing/2014/main" id="{18427A68-AA32-1F6D-7F96-7191021B650C}"/>
-              </a:ext>
-            </a:extLst>
-          </p:cNvPr>
-          <p:cNvSpPr txBox="1"/>
-          <p:nvPr/>
-        </p:nvSpPr>
-        <p:spPr>
-          <a:xfrm>
-            <a:off x="543821" y="6004249"/>
-            <a:ext cx="2354287" cy="369332"/>
-          </a:xfrm>
-          <a:prstGeom prst="rect">
-            <a:avLst/>
-          </a:prstGeom>
-          <a:noFill/>
-        </p:spPr>
-        <p:txBody>
-          <a:bodyPr wrap="square" rtlCol="0">
-            <a:spAutoFit/>
-          </a:bodyPr>
-          <a:lstStyle/>
+              <a:t>8 male-female jumpers</a:t>
+            </a:r>
+          </a:p>
           <a:p>
             <a:r>
               <a:rPr lang="en-GB" dirty="0"/>
-              <a:t>2 male-male jumpers</a:t>
-            </a:r>
-          </a:p>
-        </p:txBody>
-      </p:sp>
-      <p:sp>
-        <p:nvSpPr>
-          <p:cNvPr id="10" name="TextBox 9">
-            <a:extLst>
-              <a:ext uri="{FF2B5EF4-FFF2-40B4-BE49-F238E27FC236}">
-                <a16:creationId xmlns:a16="http://schemas.microsoft.com/office/drawing/2014/main" id="{B887EA7F-1724-A3B1-2F7D-D84194DE6E11}"/>
-              </a:ext>
-            </a:extLst>
-          </p:cNvPr>
-          <p:cNvSpPr txBox="1"/>
-          <p:nvPr/>
-        </p:nvSpPr>
-        <p:spPr>
-          <a:xfrm>
-            <a:off x="398685" y="589112"/>
-            <a:ext cx="6525990" cy="369332"/>
-          </a:xfrm>
-          <a:prstGeom prst="rect">
-            <a:avLst/>
-          </a:prstGeom>
-          <a:noFill/>
-        </p:spPr>
-        <p:txBody>
-          <a:bodyPr wrap="square" rtlCol="0">
-            <a:spAutoFit/>
-          </a:bodyPr>
-          <a:lstStyle/>
-          <a:p>
-            <a:r>
-              <a:rPr lang="en-GB" dirty="0"/>
-              <a:t>9 (??) male-female jumpers (with external power source)</a:t>
-            </a:r>
-          </a:p>
-        </p:txBody>
-      </p:sp>
-      <p:sp>
-        <p:nvSpPr>
-          <p:cNvPr id="13" name="TextBox 12">
-            <a:extLst>
-              <a:ext uri="{FF2B5EF4-FFF2-40B4-BE49-F238E27FC236}">
-                <a16:creationId xmlns:a16="http://schemas.microsoft.com/office/drawing/2014/main" id="{F0F654D7-DB78-A959-9497-6B8E0AA705B3}"/>
-              </a:ext>
-            </a:extLst>
-          </p:cNvPr>
-          <p:cNvSpPr txBox="1"/>
-          <p:nvPr/>
-        </p:nvSpPr>
-        <p:spPr>
-          <a:xfrm>
-            <a:off x="410084" y="962100"/>
-            <a:ext cx="6525990" cy="369332"/>
-          </a:xfrm>
-          <a:prstGeom prst="rect">
-            <a:avLst/>
-          </a:prstGeom>
-          <a:noFill/>
-        </p:spPr>
-        <p:txBody>
-          <a:bodyPr wrap="square" rtlCol="0">
-            <a:spAutoFit/>
-          </a:bodyPr>
-          <a:lstStyle/>
-          <a:p>
-            <a:r>
-              <a:rPr lang="en-GB" dirty="0"/>
-              <a:t>2 (??) female-female jumpers (with external power source)</a:t>
+              <a:t>4 male-male jumper</a:t>
             </a:r>
           </a:p>
         </p:txBody>
@@ -8258,6 +8130,186 @@
     <p:extLst>
       <p:ext uri="{BB962C8B-B14F-4D97-AF65-F5344CB8AC3E}">
         <p14:creationId xmlns:p14="http://schemas.microsoft.com/office/powerpoint/2010/main" val="1976924870"/>
+      </p:ext>
+    </p:extLst>
+  </p:cSld>
+  <p:clrMapOvr>
+    <a:masterClrMapping/>
+  </p:clrMapOvr>
+</p:sld>
+</file>
+
+<file path=ppt/slides/slide5.xml><?xml version="1.0" encoding="utf-8"?>
+<p:sld xmlns:a="http://schemas.openxmlformats.org/drawingml/2006/main" xmlns:r="http://schemas.openxmlformats.org/officeDocument/2006/relationships" xmlns:p="http://schemas.openxmlformats.org/presentationml/2006/main">
+  <p:cSld>
+    <p:spTree>
+      <p:nvGrpSpPr>
+        <p:cNvPr id="1" name=""/>
+        <p:cNvGrpSpPr/>
+        <p:nvPr/>
+      </p:nvGrpSpPr>
+      <p:grpSpPr>
+        <a:xfrm>
+          <a:off x="0" y="0"/>
+          <a:ext cx="0" cy="0"/>
+          <a:chOff x="0" y="0"/>
+          <a:chExt cx="0" cy="0"/>
+        </a:xfrm>
+      </p:grpSpPr>
+      <p:pic>
+        <p:nvPicPr>
+          <p:cNvPr id="2" name="Picture 1">
+            <a:extLst>
+              <a:ext uri="{FF2B5EF4-FFF2-40B4-BE49-F238E27FC236}">
+                <a16:creationId xmlns:a16="http://schemas.microsoft.com/office/drawing/2014/main" id="{A57DCCC8-8B2B-4A7D-8FB4-B119FEE16AAD}"/>
+              </a:ext>
+            </a:extLst>
+          </p:cNvPr>
+          <p:cNvPicPr>
+            <a:picLocks noChangeAspect="1"/>
+          </p:cNvPicPr>
+          <p:nvPr/>
+        </p:nvPicPr>
+        <p:blipFill>
+          <a:blip r:embed="rId2"/>
+          <a:stretch>
+            <a:fillRect/>
+          </a:stretch>
+        </p:blipFill>
+        <p:spPr>
+          <a:xfrm>
+            <a:off x="4310340" y="1216179"/>
+            <a:ext cx="6392043" cy="4328127"/>
+          </a:xfrm>
+          <a:prstGeom prst="rect">
+            <a:avLst/>
+          </a:prstGeom>
+        </p:spPr>
+      </p:pic>
+      <p:pic>
+        <p:nvPicPr>
+          <p:cNvPr id="3" name="Picture 2">
+            <a:extLst>
+              <a:ext uri="{FF2B5EF4-FFF2-40B4-BE49-F238E27FC236}">
+                <a16:creationId xmlns:a16="http://schemas.microsoft.com/office/drawing/2014/main" id="{6902506C-6DE4-ABDA-8A85-76BDFA904C82}"/>
+              </a:ext>
+            </a:extLst>
+          </p:cNvPr>
+          <p:cNvPicPr>
+            <a:picLocks noChangeAspect="1"/>
+          </p:cNvPicPr>
+          <p:nvPr/>
+        </p:nvPicPr>
+        <p:blipFill>
+          <a:blip r:embed="rId3"/>
+          <a:stretch>
+            <a:fillRect/>
+          </a:stretch>
+        </p:blipFill>
+        <p:spPr>
+          <a:xfrm>
+            <a:off x="10980662" y="2276856"/>
+            <a:ext cx="1107763" cy="2502539"/>
+          </a:xfrm>
+          <a:prstGeom prst="rect">
+            <a:avLst/>
+          </a:prstGeom>
+        </p:spPr>
+      </p:pic>
+      <p:pic>
+        <p:nvPicPr>
+          <p:cNvPr id="4" name="Picture 3">
+            <a:extLst>
+              <a:ext uri="{FF2B5EF4-FFF2-40B4-BE49-F238E27FC236}">
+                <a16:creationId xmlns:a16="http://schemas.microsoft.com/office/drawing/2014/main" id="{BD54EC3C-3DE8-56D2-6E57-4CE2B0603FBD}"/>
+              </a:ext>
+            </a:extLst>
+          </p:cNvPr>
+          <p:cNvPicPr>
+            <a:picLocks noChangeAspect="1"/>
+          </p:cNvPicPr>
+          <p:nvPr/>
+        </p:nvPicPr>
+        <p:blipFill>
+          <a:blip r:embed="rId4"/>
+          <a:stretch>
+            <a:fillRect/>
+          </a:stretch>
+        </p:blipFill>
+        <p:spPr>
+          <a:xfrm>
+            <a:off x="234450" y="1301499"/>
+            <a:ext cx="4075890" cy="4255002"/>
+          </a:xfrm>
+          <a:prstGeom prst="rect">
+            <a:avLst/>
+          </a:prstGeom>
+        </p:spPr>
+      </p:pic>
+    </p:spTree>
+    <p:extLst>
+      <p:ext uri="{BB962C8B-B14F-4D97-AF65-F5344CB8AC3E}">
+        <p14:creationId xmlns:p14="http://schemas.microsoft.com/office/powerpoint/2010/main" val="3695744759"/>
+      </p:ext>
+    </p:extLst>
+  </p:cSld>
+  <p:clrMapOvr>
+    <a:masterClrMapping/>
+  </p:clrMapOvr>
+</p:sld>
+</file>
+
+<file path=ppt/slides/slide6.xml><?xml version="1.0" encoding="utf-8"?>
+<p:sld xmlns:a="http://schemas.openxmlformats.org/drawingml/2006/main" xmlns:r="http://schemas.openxmlformats.org/officeDocument/2006/relationships" xmlns:p="http://schemas.openxmlformats.org/presentationml/2006/main">
+  <p:cSld>
+    <p:spTree>
+      <p:nvGrpSpPr>
+        <p:cNvPr id="1" name=""/>
+        <p:cNvGrpSpPr/>
+        <p:nvPr/>
+      </p:nvGrpSpPr>
+      <p:grpSpPr>
+        <a:xfrm>
+          <a:off x="0" y="0"/>
+          <a:ext cx="0" cy="0"/>
+          <a:chOff x="0" y="0"/>
+          <a:chExt cx="0" cy="0"/>
+        </a:xfrm>
+      </p:grpSpPr>
+      <p:pic>
+        <p:nvPicPr>
+          <p:cNvPr id="2" name="Picture 1">
+            <a:extLst>
+              <a:ext uri="{FF2B5EF4-FFF2-40B4-BE49-F238E27FC236}">
+                <a16:creationId xmlns:a16="http://schemas.microsoft.com/office/drawing/2014/main" id="{B53C3D47-3C60-25B6-B22D-1E2AF378215C}"/>
+              </a:ext>
+            </a:extLst>
+          </p:cNvPr>
+          <p:cNvPicPr>
+            <a:picLocks noChangeAspect="1"/>
+          </p:cNvPicPr>
+          <p:nvPr/>
+        </p:nvPicPr>
+        <p:blipFill>
+          <a:blip r:embed="rId2"/>
+          <a:stretch>
+            <a:fillRect/>
+          </a:stretch>
+        </p:blipFill>
+        <p:spPr>
+          <a:xfrm>
+            <a:off x="167126" y="1261684"/>
+            <a:ext cx="11857748" cy="4334632"/>
+          </a:xfrm>
+          <a:prstGeom prst="rect">
+            <a:avLst/>
+          </a:prstGeom>
+        </p:spPr>
+      </p:pic>
+    </p:spTree>
+    <p:extLst>
+      <p:ext uri="{BB962C8B-B14F-4D97-AF65-F5344CB8AC3E}">
+        <p14:creationId xmlns:p14="http://schemas.microsoft.com/office/powerpoint/2010/main" val="2849648356"/>
       </p:ext>
     </p:extLst>
   </p:cSld>
@@ -8580,4 +8632,199 @@
     </a:ext>
   </a:extLst>
 </a:theme>
+</file>
+
+<file path=customXml/item1.xml><?xml version="1.0" encoding="utf-8"?>
+<?mso-contentType ?>
+<FormTemplates xmlns="http://schemas.microsoft.com/sharepoint/v3/contenttype/forms">
+  <Display>DocumentLibraryForm</Display>
+  <Edit>DocumentLibraryForm</Edit>
+  <New>DocumentLibraryForm</New>
+</FormTemplates>
+</file>
+
+<file path=customXml/item2.xml><?xml version="1.0" encoding="utf-8"?>
+<p:properties xmlns:p="http://schemas.microsoft.com/office/2006/metadata/properties" xmlns:xsi="http://www.w3.org/2001/XMLSchema-instance" xmlns:pc="http://schemas.microsoft.com/office/infopath/2007/PartnerControls">
+  <documentManagement/>
+</p:properties>
+</file>
+
+<file path=customXml/item3.xml><?xml version="1.0" encoding="utf-8"?>
+<ct:contentTypeSchema xmlns:ct="http://schemas.microsoft.com/office/2006/metadata/contentType" xmlns:ma="http://schemas.microsoft.com/office/2006/metadata/properties/metaAttributes" ct:_="" ma:_="" ma:contentTypeName="Document" ma:contentTypeID="0x010100288FF80C09CDD44CBEDCB6BDA3BB791A" ma:contentTypeVersion="3" ma:contentTypeDescription="Create a new document." ma:contentTypeScope="" ma:versionID="daf59a59666b18c77d16c7900867ac2e">
+  <xsd:schema xmlns:xsd="http://www.w3.org/2001/XMLSchema" xmlns:xs="http://www.w3.org/2001/XMLSchema" xmlns:p="http://schemas.microsoft.com/office/2006/metadata/properties" xmlns:ns2="da167cd1-d7a6-4338-bc63-7a91f955c7fa" targetNamespace="http://schemas.microsoft.com/office/2006/metadata/properties" ma:root="true" ma:fieldsID="c8e8fbdc805c43d29a2e081e89408539" ns2:_="">
+    <xsd:import namespace="da167cd1-d7a6-4338-bc63-7a91f955c7fa"/>
+    <xsd:element name="properties">
+      <xsd:complexType>
+        <xsd:sequence>
+          <xsd:element name="documentManagement">
+            <xsd:complexType>
+              <xsd:all>
+                <xsd:element ref="ns2:MediaServiceMetadata" minOccurs="0"/>
+                <xsd:element ref="ns2:MediaServiceFastMetadata" minOccurs="0"/>
+                <xsd:element ref="ns2:MediaServiceSearchProperties" minOccurs="0"/>
+              </xsd:all>
+            </xsd:complexType>
+          </xsd:element>
+        </xsd:sequence>
+      </xsd:complexType>
+    </xsd:element>
+  </xsd:schema>
+  <xsd:schema xmlns:xsd="http://www.w3.org/2001/XMLSchema" xmlns:xs="http://www.w3.org/2001/XMLSchema" xmlns:dms="http://schemas.microsoft.com/office/2006/documentManagement/types" xmlns:pc="http://schemas.microsoft.com/office/infopath/2007/PartnerControls" targetNamespace="da167cd1-d7a6-4338-bc63-7a91f955c7fa" elementFormDefault="qualified">
+    <xsd:import namespace="http://schemas.microsoft.com/office/2006/documentManagement/types"/>
+    <xsd:import namespace="http://schemas.microsoft.com/office/infopath/2007/PartnerControls"/>
+    <xsd:element name="MediaServiceMetadata" ma:index="8" nillable="true" ma:displayName="MediaServiceMetadata" ma:hidden="true" ma:internalName="MediaServiceMetadata" ma:readOnly="true">
+      <xsd:simpleType>
+        <xsd:restriction base="dms:Note"/>
+      </xsd:simpleType>
+    </xsd:element>
+    <xsd:element name="MediaServiceFastMetadata" ma:index="9" nillable="true" ma:displayName="MediaServiceFastMetadata" ma:hidden="true" ma:internalName="MediaServiceFastMetadata" ma:readOnly="true">
+      <xsd:simpleType>
+        <xsd:restriction base="dms:Note"/>
+      </xsd:simpleType>
+    </xsd:element>
+    <xsd:element name="MediaServiceSearchProperties" ma:index="10" nillable="true" ma:displayName="MediaServiceSearchProperties" ma:hidden="true" ma:internalName="MediaServiceSearchProperties" ma:readOnly="true">
+      <xsd:simpleType>
+        <xsd:restriction base="dms:Note"/>
+      </xsd:simpleType>
+    </xsd:element>
+  </xsd:schema>
+  <xsd:schema xmlns="http://schemas.openxmlformats.org/package/2006/metadata/core-properties" xmlns:xsd="http://www.w3.org/2001/XMLSchema" xmlns:xsi="http://www.w3.org/2001/XMLSchema-instance" xmlns:dc="http://purl.org/dc/elements/1.1/" xmlns:dcterms="http://purl.org/dc/terms/" xmlns:odoc="http://schemas.microsoft.com/internal/obd" targetNamespace="http://schemas.openxmlformats.org/package/2006/metadata/core-properties" elementFormDefault="qualified" attributeFormDefault="unqualified" blockDefault="#all">
+    <xsd:import namespace="http://purl.org/dc/elements/1.1/" schemaLocation="http://dublincore.org/schemas/xmls/qdc/2003/04/02/dc.xsd"/>
+    <xsd:import namespace="http://purl.org/dc/terms/" schemaLocation="http://dublincore.org/schemas/xmls/qdc/2003/04/02/dcterms.xsd"/>
+    <xsd:element name="coreProperties" type="CT_coreProperties"/>
+    <xsd:complexType name="CT_coreProperties">
+      <xsd:all>
+        <xsd:element ref="dc:creator" minOccurs="0" maxOccurs="1"/>
+        <xsd:element ref="dcterms:created" minOccurs="0" maxOccurs="1"/>
+        <xsd:element ref="dc:identifier" minOccurs="0" maxOccurs="1"/>
+        <xsd:element name="contentType" minOccurs="0" maxOccurs="1" type="xsd:string" ma:index="0" ma:displayName="Content Type"/>
+        <xsd:element ref="dc:title" minOccurs="0" maxOccurs="1" ma:index="4" ma:displayName="Title"/>
+        <xsd:element ref="dc:subject" minOccurs="0" maxOccurs="1"/>
+        <xsd:element ref="dc:description" minOccurs="0" maxOccurs="1"/>
+        <xsd:element name="keywords" minOccurs="0" maxOccurs="1" type="xsd:string"/>
+        <xsd:element ref="dc:language" minOccurs="0" maxOccurs="1"/>
+        <xsd:element name="category" minOccurs="0" maxOccurs="1" type="xsd:string"/>
+        <xsd:element name="version" minOccurs="0" maxOccurs="1" type="xsd:string"/>
+        <xsd:element name="revision" minOccurs="0" maxOccurs="1" type="xsd:string">
+          <xsd:annotation>
+            <xsd:documentation>
+                        This value indicates the number of saves or revisions. The application is responsible for updating this value after each revision.
+                    </xsd:documentation>
+          </xsd:annotation>
+        </xsd:element>
+        <xsd:element name="lastModifiedBy" minOccurs="0" maxOccurs="1" type="xsd:string"/>
+        <xsd:element ref="dcterms:modified" minOccurs="0" maxOccurs="1"/>
+        <xsd:element name="contentStatus" minOccurs="0" maxOccurs="1" type="xsd:string"/>
+      </xsd:all>
+    </xsd:complexType>
+  </xsd:schema>
+  <xs:schema xmlns:pc="http://schemas.microsoft.com/office/infopath/2007/PartnerControls" xmlns:xs="http://www.w3.org/2001/XMLSchema" targetNamespace="http://schemas.microsoft.com/office/infopath/2007/PartnerControls" elementFormDefault="qualified" attributeFormDefault="unqualified">
+    <xs:element name="Person">
+      <xs:complexType>
+        <xs:sequence>
+          <xs:element ref="pc:DisplayName" minOccurs="0"/>
+          <xs:element ref="pc:AccountId" minOccurs="0"/>
+          <xs:element ref="pc:AccountType" minOccurs="0"/>
+        </xs:sequence>
+      </xs:complexType>
+    </xs:element>
+    <xs:element name="DisplayName" type="xs:string"/>
+    <xs:element name="AccountId" type="xs:string"/>
+    <xs:element name="AccountType" type="xs:string"/>
+    <xs:element name="BDCAssociatedEntity">
+      <xs:complexType>
+        <xs:sequence>
+          <xs:element ref="pc:BDCEntity" minOccurs="0" maxOccurs="unbounded"/>
+        </xs:sequence>
+        <xs:attribute ref="pc:EntityNamespace"/>
+        <xs:attribute ref="pc:EntityName"/>
+        <xs:attribute ref="pc:SystemInstanceName"/>
+        <xs:attribute ref="pc:AssociationName"/>
+      </xs:complexType>
+    </xs:element>
+    <xs:attribute name="EntityNamespace" type="xs:string"/>
+    <xs:attribute name="EntityName" type="xs:string"/>
+    <xs:attribute name="SystemInstanceName" type="xs:string"/>
+    <xs:attribute name="AssociationName" type="xs:string"/>
+    <xs:element name="BDCEntity">
+      <xs:complexType>
+        <xs:sequence>
+          <xs:element ref="pc:EntityDisplayName" minOccurs="0"/>
+          <xs:element ref="pc:EntityInstanceReference" minOccurs="0"/>
+          <xs:element ref="pc:EntityId1" minOccurs="0"/>
+          <xs:element ref="pc:EntityId2" minOccurs="0"/>
+          <xs:element ref="pc:EntityId3" minOccurs="0"/>
+          <xs:element ref="pc:EntityId4" minOccurs="0"/>
+          <xs:element ref="pc:EntityId5" minOccurs="0"/>
+        </xs:sequence>
+      </xs:complexType>
+    </xs:element>
+    <xs:element name="EntityDisplayName" type="xs:string"/>
+    <xs:element name="EntityInstanceReference" type="xs:string"/>
+    <xs:element name="EntityId1" type="xs:string"/>
+    <xs:element name="EntityId2" type="xs:string"/>
+    <xs:element name="EntityId3" type="xs:string"/>
+    <xs:element name="EntityId4" type="xs:string"/>
+    <xs:element name="EntityId5" type="xs:string"/>
+    <xs:element name="Terms">
+      <xs:complexType>
+        <xs:sequence>
+          <xs:element ref="pc:TermInfo" minOccurs="0" maxOccurs="unbounded"/>
+        </xs:sequence>
+      </xs:complexType>
+    </xs:element>
+    <xs:element name="TermInfo">
+      <xs:complexType>
+        <xs:sequence>
+          <xs:element ref="pc:TermName" minOccurs="0"/>
+          <xs:element ref="pc:TermId" minOccurs="0"/>
+        </xs:sequence>
+      </xs:complexType>
+    </xs:element>
+    <xs:element name="TermName" type="xs:string"/>
+    <xs:element name="TermId" type="xs:string"/>
+  </xs:schema>
+</ct:contentTypeSchema>
+</file>
+
+<file path=customXml/itemProps1.xml><?xml version="1.0" encoding="utf-8"?>
+<ds:datastoreItem xmlns:ds="http://schemas.openxmlformats.org/officeDocument/2006/customXml" ds:itemID="{5AE52506-7CE9-47B7-A5D7-1E2DAD9FF737}">
+  <ds:schemaRefs>
+    <ds:schemaRef ds:uri="http://schemas.microsoft.com/sharepoint/v3/contenttype/forms"/>
+  </ds:schemaRefs>
+</ds:datastoreItem>
+</file>
+
+<file path=customXml/itemProps2.xml><?xml version="1.0" encoding="utf-8"?>
+<ds:datastoreItem xmlns:ds="http://schemas.openxmlformats.org/officeDocument/2006/customXml" ds:itemID="{E006B557-63CF-4535-8A8B-2B44088154D0}">
+  <ds:schemaRefs>
+    <ds:schemaRef ds:uri="http://schemas.microsoft.com/office/2006/metadata/properties"/>
+    <ds:schemaRef ds:uri="http://purl.org/dc/dcmitype/"/>
+    <ds:schemaRef ds:uri="http://purl.org/dc/terms/"/>
+    <ds:schemaRef ds:uri="http://www.w3.org/XML/1998/namespace"/>
+    <ds:schemaRef ds:uri="http://schemas.microsoft.com/office/2006/documentManagement/types"/>
+    <ds:schemaRef ds:uri="da167cd1-d7a6-4338-bc63-7a91f955c7fa"/>
+    <ds:schemaRef ds:uri="http://purl.org/dc/elements/1.1/"/>
+    <ds:schemaRef ds:uri="http://schemas.microsoft.com/office/infopath/2007/PartnerControls"/>
+    <ds:schemaRef ds:uri="http://schemas.openxmlformats.org/package/2006/metadata/core-properties"/>
+  </ds:schemaRefs>
+</ds:datastoreItem>
+</file>
+
+<file path=customXml/itemProps3.xml><?xml version="1.0" encoding="utf-8"?>
+<ds:datastoreItem xmlns:ds="http://schemas.openxmlformats.org/officeDocument/2006/customXml" ds:itemID="{589A82EC-D0C1-4ED0-8296-8BFA539A031E}">
+  <ds:schemaRefs>
+    <ds:schemaRef ds:uri="http://schemas.microsoft.com/office/2006/metadata/contentType"/>
+    <ds:schemaRef ds:uri="http://schemas.microsoft.com/office/2006/metadata/properties/metaAttributes"/>
+    <ds:schemaRef ds:uri="http://www.w3.org/2001/XMLSchema"/>
+    <ds:schemaRef ds:uri="http://schemas.microsoft.com/office/2006/metadata/properties"/>
+    <ds:schemaRef ds:uri="da167cd1-d7a6-4338-bc63-7a91f955c7fa"/>
+    <ds:schemaRef ds:uri="http://schemas.microsoft.com/office/2006/documentManagement/types"/>
+    <ds:schemaRef ds:uri="http://schemas.microsoft.com/office/infopath/2007/PartnerControls"/>
+    <ds:schemaRef ds:uri="http://schemas.openxmlformats.org/package/2006/metadata/core-properties"/>
+    <ds:schemaRef ds:uri="http://purl.org/dc/elements/1.1/"/>
+    <ds:schemaRef ds:uri="http://purl.org/dc/terms/"/>
+    <ds:schemaRef ds:uri="http://schemas.microsoft.com/internal/obd"/>
+  </ds:schemaRefs>
+</ds:datastoreItem>
 </file>
</xml_diff>